<commit_message>
修正匯出功能 1. Add kotlin code function to call file picker 2. Save to file.(Fix export function)
</commit_message>
<xml_diff>
--- a/小卡冊專案計劃.pptx
+++ b/小卡冊專案計劃.pptx
@@ -10,22 +10,19 @@
     <p:sldId id="258" r:id="rId4"/>
     <p:sldId id="259" r:id="rId5"/>
     <p:sldId id="260" r:id="rId6"/>
-    <p:sldId id="261" r:id="rId7"/>
-    <p:sldId id="262" r:id="rId8"/>
-    <p:sldId id="264" r:id="rId9"/>
-    <p:sldId id="276" r:id="rId10"/>
-    <p:sldId id="263" r:id="rId11"/>
-    <p:sldId id="265" r:id="rId12"/>
-    <p:sldId id="266" r:id="rId13"/>
-    <p:sldId id="267" r:id="rId14"/>
-    <p:sldId id="268" r:id="rId15"/>
-    <p:sldId id="269" r:id="rId16"/>
-    <p:sldId id="270" r:id="rId17"/>
-    <p:sldId id="271" r:id="rId18"/>
-    <p:sldId id="272" r:id="rId19"/>
-    <p:sldId id="273" r:id="rId20"/>
-    <p:sldId id="274" r:id="rId21"/>
-    <p:sldId id="275" r:id="rId22"/>
+    <p:sldId id="262" r:id="rId7"/>
+    <p:sldId id="264" r:id="rId8"/>
+    <p:sldId id="276" r:id="rId9"/>
+    <p:sldId id="263" r:id="rId10"/>
+    <p:sldId id="266" r:id="rId11"/>
+    <p:sldId id="271" r:id="rId12"/>
+    <p:sldId id="270" r:id="rId13"/>
+    <p:sldId id="272" r:id="rId14"/>
+    <p:sldId id="273" r:id="rId15"/>
+    <p:sldId id="274" r:id="rId16"/>
+    <p:sldId id="277" r:id="rId17"/>
+    <p:sldId id="278" r:id="rId18"/>
+    <p:sldId id="275" r:id="rId19"/>
   </p:sldIdLst>
   <p:sldSz cx="12192000" cy="6858000"/>
   <p:notesSz cx="6858000" cy="9144000"/>
@@ -279,7 +276,7 @@
           <a:p>
             <a:fld id="{2C359ED7-E6BF-48D9-BB10-ED4E2C8B770C}" type="datetimeFigureOut">
               <a:rPr lang="zh-TW" altLang="en-US" smtClean="0"/>
-              <a:t>2023/7/8</a:t>
+              <a:t>2023/7/19</a:t>
             </a:fld>
             <a:endParaRPr lang="zh-TW" altLang="en-US"/>
           </a:p>
@@ -477,7 +474,7 @@
           <a:p>
             <a:fld id="{2C359ED7-E6BF-48D9-BB10-ED4E2C8B770C}" type="datetimeFigureOut">
               <a:rPr lang="zh-TW" altLang="en-US" smtClean="0"/>
-              <a:t>2023/7/8</a:t>
+              <a:t>2023/7/19</a:t>
             </a:fld>
             <a:endParaRPr lang="zh-TW" altLang="en-US"/>
           </a:p>
@@ -685,7 +682,7 @@
           <a:p>
             <a:fld id="{2C359ED7-E6BF-48D9-BB10-ED4E2C8B770C}" type="datetimeFigureOut">
               <a:rPr lang="zh-TW" altLang="en-US" smtClean="0"/>
-              <a:t>2023/7/8</a:t>
+              <a:t>2023/7/19</a:t>
             </a:fld>
             <a:endParaRPr lang="zh-TW" altLang="en-US"/>
           </a:p>
@@ -883,7 +880,7 @@
           <a:p>
             <a:fld id="{2C359ED7-E6BF-48D9-BB10-ED4E2C8B770C}" type="datetimeFigureOut">
               <a:rPr lang="zh-TW" altLang="en-US" smtClean="0"/>
-              <a:t>2023/7/8</a:t>
+              <a:t>2023/7/19</a:t>
             </a:fld>
             <a:endParaRPr lang="zh-TW" altLang="en-US"/>
           </a:p>
@@ -1158,7 +1155,7 @@
           <a:p>
             <a:fld id="{2C359ED7-E6BF-48D9-BB10-ED4E2C8B770C}" type="datetimeFigureOut">
               <a:rPr lang="zh-TW" altLang="en-US" smtClean="0"/>
-              <a:t>2023/7/8</a:t>
+              <a:t>2023/7/19</a:t>
             </a:fld>
             <a:endParaRPr lang="zh-TW" altLang="en-US"/>
           </a:p>
@@ -1423,7 +1420,7 @@
           <a:p>
             <a:fld id="{2C359ED7-E6BF-48D9-BB10-ED4E2C8B770C}" type="datetimeFigureOut">
               <a:rPr lang="zh-TW" altLang="en-US" smtClean="0"/>
-              <a:t>2023/7/8</a:t>
+              <a:t>2023/7/19</a:t>
             </a:fld>
             <a:endParaRPr lang="zh-TW" altLang="en-US"/>
           </a:p>
@@ -1835,7 +1832,7 @@
           <a:p>
             <a:fld id="{2C359ED7-E6BF-48D9-BB10-ED4E2C8B770C}" type="datetimeFigureOut">
               <a:rPr lang="zh-TW" altLang="en-US" smtClean="0"/>
-              <a:t>2023/7/8</a:t>
+              <a:t>2023/7/19</a:t>
             </a:fld>
             <a:endParaRPr lang="zh-TW" altLang="en-US"/>
           </a:p>
@@ -1976,7 +1973,7 @@
           <a:p>
             <a:fld id="{2C359ED7-E6BF-48D9-BB10-ED4E2C8B770C}" type="datetimeFigureOut">
               <a:rPr lang="zh-TW" altLang="en-US" smtClean="0"/>
-              <a:t>2023/7/8</a:t>
+              <a:t>2023/7/19</a:t>
             </a:fld>
             <a:endParaRPr lang="zh-TW" altLang="en-US"/>
           </a:p>
@@ -2089,7 +2086,7 @@
           <a:p>
             <a:fld id="{2C359ED7-E6BF-48D9-BB10-ED4E2C8B770C}" type="datetimeFigureOut">
               <a:rPr lang="zh-TW" altLang="en-US" smtClean="0"/>
-              <a:t>2023/7/8</a:t>
+              <a:t>2023/7/19</a:t>
             </a:fld>
             <a:endParaRPr lang="zh-TW" altLang="en-US"/>
           </a:p>
@@ -2400,7 +2397,7 @@
           <a:p>
             <a:fld id="{2C359ED7-E6BF-48D9-BB10-ED4E2C8B770C}" type="datetimeFigureOut">
               <a:rPr lang="zh-TW" altLang="en-US" smtClean="0"/>
-              <a:t>2023/7/8</a:t>
+              <a:t>2023/7/19</a:t>
             </a:fld>
             <a:endParaRPr lang="zh-TW" altLang="en-US"/>
           </a:p>
@@ -2688,7 +2685,7 @@
           <a:p>
             <a:fld id="{2C359ED7-E6BF-48D9-BB10-ED4E2C8B770C}" type="datetimeFigureOut">
               <a:rPr lang="zh-TW" altLang="en-US" smtClean="0"/>
-              <a:t>2023/7/8</a:t>
+              <a:t>2023/7/19</a:t>
             </a:fld>
             <a:endParaRPr lang="zh-TW" altLang="en-US"/>
           </a:p>
@@ -2929,7 +2926,7 @@
           <a:p>
             <a:fld id="{2C359ED7-E6BF-48D9-BB10-ED4E2C8B770C}" type="datetimeFigureOut">
               <a:rPr lang="zh-TW" altLang="en-US" smtClean="0"/>
-              <a:t>2023/7/8</a:t>
+              <a:t>2023/7/19</a:t>
             </a:fld>
             <a:endParaRPr lang="zh-TW" altLang="en-US"/>
           </a:p>
@@ -3362,7 +3359,12 @@
             <p:ph type="ctrTitle"/>
           </p:nvPr>
         </p:nvSpPr>
-        <p:spPr/>
+        <p:spPr>
+          <a:xfrm>
+            <a:off x="1524000" y="989843"/>
+            <a:ext cx="9144000" cy="2387600"/>
+          </a:xfrm>
+        </p:spPr>
         <p:txBody>
           <a:bodyPr>
             <a:noAutofit/>
@@ -3370,24 +3372,11 @@
           <a:lstStyle/>
           <a:p>
             <a:r>
-              <a:rPr lang="zh-TW" altLang="en-US" sz="4800" dirty="0">
-                <a:latin typeface="Times New Roman" panose="02020603050405020304" pitchFamily="18" charset="0"/>
-                <a:cs typeface="Times New Roman" panose="02020603050405020304" pitchFamily="18" charset="0"/>
-              </a:rPr>
-              <a:t>小卡冊</a:t>
-            </a:r>
-            <a:br>
-              <a:rPr lang="zh-TW" altLang="en-US" sz="4800" dirty="0">
-                <a:latin typeface="Times New Roman" panose="02020603050405020304" pitchFamily="18" charset="0"/>
-                <a:cs typeface="Times New Roman" panose="02020603050405020304" pitchFamily="18" charset="0"/>
-              </a:rPr>
-            </a:br>
-            <a:r>
-              <a:rPr lang="en-US" altLang="zh-TW" sz="4800" dirty="0">
-                <a:latin typeface="Times New Roman" panose="02020603050405020304" pitchFamily="18" charset="0"/>
-                <a:cs typeface="Times New Roman" panose="02020603050405020304" pitchFamily="18" charset="0"/>
-              </a:rPr>
-              <a:t>Card Book </a:t>
+              <a:rPr lang="en-US" altLang="zh-TW" sz="4800" dirty="0" err="1">
+                <a:latin typeface="Times New Roman" panose="02020603050405020304" pitchFamily="18" charset="0"/>
+                <a:cs typeface="Times New Roman" panose="02020603050405020304" pitchFamily="18" charset="0"/>
+              </a:rPr>
+              <a:t>CountDeck</a:t>
             </a:r>
             <a:br>
               <a:rPr lang="en-US" altLang="zh-TW" sz="4800" dirty="0">
@@ -3453,9 +3442,16 @@
             <p:ph type="subTitle" idx="1"/>
           </p:nvPr>
         </p:nvSpPr>
-        <p:spPr/>
-        <p:txBody>
-          <a:bodyPr/>
+        <p:spPr>
+          <a:xfrm>
+            <a:off x="1524000" y="3602037"/>
+            <a:ext cx="9144000" cy="3010797"/>
+          </a:xfrm>
+        </p:spPr>
+        <p:txBody>
+          <a:bodyPr>
+            <a:normAutofit/>
+          </a:bodyPr>
           <a:lstStyle/>
           <a:p>
             <a:r>
@@ -3493,6 +3489,64 @@
               </a:rPr>
               <a:t>，可進行計算、統計、圖表展示或當小日記</a:t>
             </a:r>
+            <a:endParaRPr lang="en-US" altLang="zh-TW" dirty="0">
+              <a:latin typeface="Times New Roman" panose="02020603050405020304" pitchFamily="18" charset="0"/>
+              <a:cs typeface="Times New Roman" panose="02020603050405020304" pitchFamily="18" charset="0"/>
+            </a:endParaRPr>
+          </a:p>
+          <a:p>
+            <a:endParaRPr lang="en-US" altLang="zh-TW" dirty="0">
+              <a:latin typeface="Times New Roman" panose="02020603050405020304" pitchFamily="18" charset="0"/>
+              <a:cs typeface="Times New Roman" panose="02020603050405020304" pitchFamily="18" charset="0"/>
+            </a:endParaRPr>
+          </a:p>
+          <a:p>
+            <a:r>
+              <a:rPr lang="zh-TW" altLang="en-US" dirty="0">
+                <a:latin typeface="Times New Roman" panose="02020603050405020304" pitchFamily="18" charset="0"/>
+                <a:cs typeface="Times New Roman" panose="02020603050405020304" pitchFamily="18" charset="0"/>
+              </a:rPr>
+              <a:t>參與人員：吳沛澄</a:t>
+            </a:r>
+            <a:endParaRPr lang="en-US" altLang="zh-TW" dirty="0">
+              <a:latin typeface="Times New Roman" panose="02020603050405020304" pitchFamily="18" charset="0"/>
+              <a:cs typeface="Times New Roman" panose="02020603050405020304" pitchFamily="18" charset="0"/>
+            </a:endParaRPr>
+          </a:p>
+          <a:p>
+            <a:r>
+              <a:rPr lang="zh-TW" altLang="en-US" dirty="0">
+                <a:latin typeface="Times New Roman" panose="02020603050405020304" pitchFamily="18" charset="0"/>
+                <a:cs typeface="Times New Roman" panose="02020603050405020304" pitchFamily="18" charset="0"/>
+              </a:rPr>
+              <a:t>專案時長：</a:t>
+            </a:r>
+            <a:r>
+              <a:rPr lang="en-US" altLang="zh-TW" dirty="0">
+                <a:latin typeface="Times New Roman" panose="02020603050405020304" pitchFamily="18" charset="0"/>
+                <a:cs typeface="Times New Roman" panose="02020603050405020304" pitchFamily="18" charset="0"/>
+              </a:rPr>
+              <a:t>14</a:t>
+            </a:r>
+            <a:r>
+              <a:rPr lang="zh-TW" altLang="en-US" dirty="0">
+                <a:latin typeface="Times New Roman" panose="02020603050405020304" pitchFamily="18" charset="0"/>
+                <a:cs typeface="Times New Roman" panose="02020603050405020304" pitchFamily="18" charset="0"/>
+              </a:rPr>
+              <a:t>天</a:t>
+            </a:r>
+          </a:p>
+          <a:p>
+            <a:endParaRPr lang="zh-TW" altLang="en-US" dirty="0">
+              <a:latin typeface="Times New Roman" panose="02020603050405020304" pitchFamily="18" charset="0"/>
+              <a:cs typeface="Times New Roman" panose="02020603050405020304" pitchFamily="18" charset="0"/>
+            </a:endParaRPr>
+          </a:p>
+          <a:p>
+            <a:endParaRPr lang="zh-TW" altLang="en-US" dirty="0">
+              <a:latin typeface="Times New Roman" panose="02020603050405020304" pitchFamily="18" charset="0"/>
+              <a:cs typeface="Times New Roman" panose="02020603050405020304" pitchFamily="18" charset="0"/>
+            </a:endParaRPr>
           </a:p>
           <a:p>
             <a:endParaRPr lang="zh-TW" altLang="en-US" dirty="0"/>
@@ -3540,7 +3594,7 @@
           <p:cNvPr id="2" name="標題 1">
             <a:extLst>
               <a:ext uri="{FF2B5EF4-FFF2-40B4-BE49-F238E27FC236}">
-                <a16:creationId xmlns:a16="http://schemas.microsoft.com/office/drawing/2014/main" id="{B1D47424-459B-E2D9-7BC7-35ABD5E58787}"/>
+                <a16:creationId xmlns:a16="http://schemas.microsoft.com/office/drawing/2014/main" id="{8B993A50-A82F-C5E1-19BC-8D1DA7F49EC2}"/>
               </a:ext>
             </a:extLst>
           </p:cNvPr>
@@ -3558,17 +3612,17 @@
           <a:p>
             <a:r>
               <a:rPr lang="zh-TW" altLang="en-US" dirty="0"/>
-              <a:t>產品設計</a:t>
-            </a:r>
-          </a:p>
-        </p:txBody>
-      </p:sp>
-      <p:sp>
-        <p:nvSpPr>
-          <p:cNvPr id="3" name="內容版面配置區 2">
-            <a:extLst>
-              <a:ext uri="{FF2B5EF4-FFF2-40B4-BE49-F238E27FC236}">
-                <a16:creationId xmlns:a16="http://schemas.microsoft.com/office/drawing/2014/main" id="{F1DDA1D0-488C-431C-CE31-1F82B2E83A6D}"/>
+              <a:t>功能設計需求</a:t>
+            </a:r>
+          </a:p>
+        </p:txBody>
+      </p:sp>
+      <p:sp>
+        <p:nvSpPr>
+          <p:cNvPr id="4" name="內容版面配置區 2">
+            <a:extLst>
+              <a:ext uri="{FF2B5EF4-FFF2-40B4-BE49-F238E27FC236}">
+                <a16:creationId xmlns:a16="http://schemas.microsoft.com/office/drawing/2014/main" id="{0A407ABA-FDD3-9310-CD9D-5E7BEBCBF555}"/>
               </a:ext>
             </a:extLst>
           </p:cNvPr>
@@ -3579,10 +3633,15 @@
             <p:ph idx="1"/>
           </p:nvPr>
         </p:nvSpPr>
-        <p:spPr/>
+        <p:spPr>
+          <a:xfrm>
+            <a:off x="838200" y="1825625"/>
+            <a:ext cx="10515600" cy="4351338"/>
+          </a:xfrm>
+        </p:spPr>
         <p:txBody>
           <a:bodyPr>
-            <a:normAutofit lnSpcReduction="10000"/>
+            <a:normAutofit fontScale="92500" lnSpcReduction="20000"/>
           </a:bodyPr>
           <a:lstStyle/>
           <a:p>
@@ -3592,11 +3651,10 @@
                 <a:ea typeface="+mj-ea"/>
                 <a:cs typeface="Times New Roman" panose="02020603050405020304" pitchFamily="18" charset="0"/>
               </a:rPr>
-              <a:t>預期賣點</a:t>
-            </a:r>
-            <a:endParaRPr lang="en-US" altLang="zh-TW" sz="3000" dirty="0">
-              <a:latin typeface="+mj-ea"/>
-              <a:ea typeface="+mj-ea"/>
+              <a:t>功能設計</a:t>
+            </a:r>
+            <a:endParaRPr lang="zh-TW" altLang="en-US" sz="2600" dirty="0">
+              <a:latin typeface="Times New Roman" panose="02020603050405020304" pitchFamily="18" charset="0"/>
               <a:cs typeface="Times New Roman" panose="02020603050405020304" pitchFamily="18" charset="0"/>
             </a:endParaRPr>
           </a:p>
@@ -3610,7 +3668,42 @@
                 <a:latin typeface="Times New Roman" panose="02020603050405020304" pitchFamily="18" charset="0"/>
                 <a:cs typeface="Times New Roman" panose="02020603050405020304" pitchFamily="18" charset="0"/>
               </a:rPr>
-              <a:t>最快產生計數器</a:t>
+              <a:t>跨平台</a:t>
+            </a:r>
+            <a:r>
+              <a:rPr lang="en-US" altLang="zh-TW" sz="2600" dirty="0">
+                <a:latin typeface="Times New Roman" panose="02020603050405020304" pitchFamily="18" charset="0"/>
+                <a:cs typeface="Times New Roman" panose="02020603050405020304" pitchFamily="18" charset="0"/>
+              </a:rPr>
+              <a:t>(Android</a:t>
+            </a:r>
+            <a:r>
+              <a:rPr lang="zh-TW" altLang="en-US" sz="2600" dirty="0">
+                <a:latin typeface="Times New Roman" panose="02020603050405020304" pitchFamily="18" charset="0"/>
+                <a:cs typeface="Times New Roman" panose="02020603050405020304" pitchFamily="18" charset="0"/>
+              </a:rPr>
+              <a:t>、</a:t>
+            </a:r>
+            <a:r>
+              <a:rPr lang="en-US" altLang="zh-TW" sz="2600" dirty="0">
+                <a:latin typeface="Times New Roman" panose="02020603050405020304" pitchFamily="18" charset="0"/>
+                <a:cs typeface="Times New Roman" panose="02020603050405020304" pitchFamily="18" charset="0"/>
+              </a:rPr>
+              <a:t>iOS</a:t>
+            </a:r>
+            <a:r>
+              <a:rPr lang="zh-TW" altLang="en-US" sz="2600" dirty="0">
+                <a:latin typeface="Times New Roman" panose="02020603050405020304" pitchFamily="18" charset="0"/>
+                <a:cs typeface="Times New Roman" panose="02020603050405020304" pitchFamily="18" charset="0"/>
+              </a:rPr>
+              <a:t>、</a:t>
+            </a:r>
+            <a:r>
+              <a:rPr lang="en-US" altLang="zh-TW" sz="2600" dirty="0">
+                <a:latin typeface="Times New Roman" panose="02020603050405020304" pitchFamily="18" charset="0"/>
+                <a:cs typeface="Times New Roman" panose="02020603050405020304" pitchFamily="18" charset="0"/>
+              </a:rPr>
+              <a:t>Web)</a:t>
             </a:r>
           </a:p>
           <a:p>
@@ -3623,7 +3716,14 @@
                 <a:latin typeface="Times New Roman" panose="02020603050405020304" pitchFamily="18" charset="0"/>
                 <a:cs typeface="Times New Roman" panose="02020603050405020304" pitchFamily="18" charset="0"/>
               </a:rPr>
-              <a:t>自動亂數產生顏色</a:t>
+              <a:t>資料庫</a:t>
+            </a:r>
+            <a:r>
+              <a:rPr lang="en-US" altLang="zh-TW" sz="2600" dirty="0">
+                <a:latin typeface="Times New Roman" panose="02020603050405020304" pitchFamily="18" charset="0"/>
+                <a:cs typeface="Times New Roman" panose="02020603050405020304" pitchFamily="18" charset="0"/>
+              </a:rPr>
+              <a:t>CRUD</a:t>
             </a:r>
           </a:p>
           <a:p>
@@ -3636,7 +3736,7 @@
                 <a:latin typeface="Times New Roman" panose="02020603050405020304" pitchFamily="18" charset="0"/>
                 <a:cs typeface="Times New Roman" panose="02020603050405020304" pitchFamily="18" charset="0"/>
               </a:rPr>
-              <a:t>自由的分類與計數器組合</a:t>
+              <a:t>計數功能</a:t>
             </a:r>
           </a:p>
           <a:p>
@@ -3649,28 +3749,7 @@
                 <a:latin typeface="Times New Roman" panose="02020603050405020304" pitchFamily="18" charset="0"/>
                 <a:cs typeface="Times New Roman" panose="02020603050405020304" pitchFamily="18" charset="0"/>
               </a:rPr>
-              <a:t>好看的自定外觀設計</a:t>
-            </a:r>
-            <a:r>
-              <a:rPr lang="en-US" altLang="zh-TW" sz="2600" dirty="0">
-                <a:latin typeface="Times New Roman" panose="02020603050405020304" pitchFamily="18" charset="0"/>
-                <a:cs typeface="Times New Roman" panose="02020603050405020304" pitchFamily="18" charset="0"/>
-              </a:rPr>
-              <a:t>(</a:t>
-            </a:r>
-            <a:r>
-              <a:rPr lang="zh-TW" altLang="en-US" sz="2600" dirty="0">
-                <a:latin typeface="Times New Roman" panose="02020603050405020304" pitchFamily="18" charset="0"/>
-                <a:cs typeface="Times New Roman" panose="02020603050405020304" pitchFamily="18" charset="0"/>
-              </a:rPr>
-              <a:t>需訂閱開啟</a:t>
-            </a:r>
-            <a:r>
-              <a:rPr lang="en-US" altLang="zh-TW" sz="2600" dirty="0">
-                <a:latin typeface="Times New Roman" panose="02020603050405020304" pitchFamily="18" charset="0"/>
-                <a:cs typeface="Times New Roman" panose="02020603050405020304" pitchFamily="18" charset="0"/>
-              </a:rPr>
-              <a:t>)</a:t>
+              <a:t>分頁分類</a:t>
             </a:r>
           </a:p>
           <a:p>
@@ -3683,7 +3762,7 @@
                 <a:latin typeface="Times New Roman" panose="02020603050405020304" pitchFamily="18" charset="0"/>
                 <a:cs typeface="Times New Roman" panose="02020603050405020304" pitchFamily="18" charset="0"/>
               </a:rPr>
-              <a:t>可一次刪除多個</a:t>
+              <a:t>非關連式資料</a:t>
             </a:r>
           </a:p>
           <a:p>
@@ -3696,7 +3775,7 @@
                 <a:latin typeface="Times New Roman" panose="02020603050405020304" pitchFamily="18" charset="0"/>
                 <a:cs typeface="Times New Roman" panose="02020603050405020304" pitchFamily="18" charset="0"/>
               </a:rPr>
-              <a:t>可自定排序</a:t>
+              <a:t>選色器</a:t>
             </a:r>
           </a:p>
           <a:p>
@@ -3709,7 +3788,47 @@
                 <a:latin typeface="Times New Roman" panose="02020603050405020304" pitchFamily="18" charset="0"/>
                 <a:cs typeface="Times New Roman" panose="02020603050405020304" pitchFamily="18" charset="0"/>
               </a:rPr>
-              <a:t>生成簡易圖表、分析圖表</a:t>
+              <a:t>網格狀排列、</a:t>
+            </a:r>
+            <a:r>
+              <a:rPr lang="en-US" altLang="zh-TW" sz="2600" dirty="0">
+                <a:latin typeface="Times New Roman" panose="02020603050405020304" pitchFamily="18" charset="0"/>
+                <a:cs typeface="Times New Roman" panose="02020603050405020304" pitchFamily="18" charset="0"/>
+              </a:rPr>
+              <a:t>List</a:t>
+            </a:r>
+            <a:r>
+              <a:rPr lang="zh-TW" altLang="en-US" sz="2600" dirty="0">
+                <a:latin typeface="Times New Roman" panose="02020603050405020304" pitchFamily="18" charset="0"/>
+                <a:cs typeface="Times New Roman" panose="02020603050405020304" pitchFamily="18" charset="0"/>
+              </a:rPr>
+              <a:t>排列</a:t>
+            </a:r>
+          </a:p>
+          <a:p>
+            <a:pPr marL="514350" indent="-514350">
+              <a:buFont typeface="+mj-lt"/>
+              <a:buAutoNum type="arabicPeriod"/>
+            </a:pPr>
+            <a:r>
+              <a:rPr lang="zh-TW" altLang="en-US" sz="2600" dirty="0">
+                <a:latin typeface="Times New Roman" panose="02020603050405020304" pitchFamily="18" charset="0"/>
+                <a:cs typeface="Times New Roman" panose="02020603050405020304" pitchFamily="18" charset="0"/>
+              </a:rPr>
+              <a:t>圖表類、富文本套件引用</a:t>
+            </a:r>
+          </a:p>
+          <a:p>
+            <a:pPr marL="514350" indent="-514350">
+              <a:buFont typeface="+mj-lt"/>
+              <a:buAutoNum type="arabicPeriod"/>
+            </a:pPr>
+            <a:r>
+              <a:rPr lang="zh-TW" altLang="en-US" sz="2600" dirty="0">
+                <a:latin typeface="Times New Roman" panose="02020603050405020304" pitchFamily="18" charset="0"/>
+                <a:cs typeface="Times New Roman" panose="02020603050405020304" pitchFamily="18" charset="0"/>
+              </a:rPr>
+              <a:t>檔案讀寫及權限</a:t>
             </a:r>
             <a:endParaRPr lang="en-US" altLang="zh-TW" sz="2600" dirty="0">
               <a:latin typeface="Times New Roman" panose="02020603050405020304" pitchFamily="18" charset="0"/>
@@ -3726,12 +3845,8 @@
                 <a:latin typeface="Times New Roman" panose="02020603050405020304" pitchFamily="18" charset="0"/>
                 <a:cs typeface="Times New Roman" panose="02020603050405020304" pitchFamily="18" charset="0"/>
               </a:rPr>
-              <a:t>可加入圖文記錄，當小日記</a:t>
-            </a:r>
-            <a:endParaRPr lang="en-US" altLang="zh-TW" sz="2600" dirty="0">
-              <a:latin typeface="Times New Roman" panose="02020603050405020304" pitchFamily="18" charset="0"/>
-              <a:cs typeface="Times New Roman" panose="02020603050405020304" pitchFamily="18" charset="0"/>
-            </a:endParaRPr>
+              <a:t>加入廣告</a:t>
+            </a:r>
           </a:p>
           <a:p>
             <a:endParaRPr lang="en-US" altLang="zh-TW" dirty="0">
@@ -3750,7 +3865,7 @@
     </p:spTree>
     <p:extLst>
       <p:ext uri="{BB962C8B-B14F-4D97-AF65-F5344CB8AC3E}">
-        <p14:creationId xmlns:p14="http://schemas.microsoft.com/office/powerpoint/2010/main" val="2696443474"/>
+        <p14:creationId xmlns:p14="http://schemas.microsoft.com/office/powerpoint/2010/main" val="2811906351"/>
       </p:ext>
     </p:extLst>
   </p:cSld>
@@ -3782,7 +3897,7 @@
           <p:cNvPr id="2" name="標題 1">
             <a:extLst>
               <a:ext uri="{FF2B5EF4-FFF2-40B4-BE49-F238E27FC236}">
-                <a16:creationId xmlns:a16="http://schemas.microsoft.com/office/drawing/2014/main" id="{6CE8C676-096F-C85C-AB3B-EF8599F2C803}"/>
+                <a16:creationId xmlns:a16="http://schemas.microsoft.com/office/drawing/2014/main" id="{08199279-1731-2237-8CC0-F17EAF776A97}"/>
               </a:ext>
             </a:extLst>
           </p:cNvPr>
@@ -3800,17 +3915,17 @@
           <a:p>
             <a:r>
               <a:rPr lang="zh-TW" altLang="en-US" dirty="0"/>
-              <a:t>流程規劃</a:t>
-            </a:r>
-          </a:p>
-        </p:txBody>
-      </p:sp>
-      <p:sp>
-        <p:nvSpPr>
-          <p:cNvPr id="3" name="內容版面配置區 2">
-            <a:extLst>
-              <a:ext uri="{FF2B5EF4-FFF2-40B4-BE49-F238E27FC236}">
-                <a16:creationId xmlns:a16="http://schemas.microsoft.com/office/drawing/2014/main" id="{74D6CE53-A581-34E6-D79C-0F6DDAE4B77A}"/>
+              <a:t>測試計劃</a:t>
+            </a:r>
+          </a:p>
+        </p:txBody>
+      </p:sp>
+      <p:sp>
+        <p:nvSpPr>
+          <p:cNvPr id="4" name="內容版面配置區 2">
+            <a:extLst>
+              <a:ext uri="{FF2B5EF4-FFF2-40B4-BE49-F238E27FC236}">
+                <a16:creationId xmlns:a16="http://schemas.microsoft.com/office/drawing/2014/main" id="{3A7FF320-A4C5-AB63-B743-E13E34BD6CFF}"/>
               </a:ext>
             </a:extLst>
           </p:cNvPr>
@@ -3821,19 +3936,269 @@
             <p:ph idx="1"/>
           </p:nvPr>
         </p:nvSpPr>
-        <p:spPr/>
-        <p:txBody>
-          <a:bodyPr/>
-          <a:lstStyle/>
-          <a:p>
-            <a:endParaRPr lang="zh-TW" altLang="en-US"/>
+        <p:spPr>
+          <a:xfrm>
+            <a:off x="838200" y="1825625"/>
+            <a:ext cx="10515600" cy="4351338"/>
+          </a:xfrm>
+        </p:spPr>
+        <p:txBody>
+          <a:bodyPr>
+            <a:normAutofit fontScale="62500" lnSpcReduction="20000"/>
+          </a:bodyPr>
+          <a:lstStyle/>
+          <a:p>
+            <a:r>
+              <a:rPr lang="zh-TW" altLang="en-US" sz="3000" dirty="0">
+                <a:latin typeface="+mj-ea"/>
+                <a:ea typeface="+mj-ea"/>
+                <a:cs typeface="Times New Roman" panose="02020603050405020304" pitchFamily="18" charset="0"/>
+              </a:rPr>
+              <a:t>單元測試、功能性測試</a:t>
+            </a:r>
+          </a:p>
+          <a:p>
+            <a:r>
+              <a:rPr lang="zh-TW" altLang="en-US" sz="3000" dirty="0">
+                <a:latin typeface="+mj-ea"/>
+                <a:ea typeface="+mj-ea"/>
+                <a:cs typeface="Times New Roman" panose="02020603050405020304" pitchFamily="18" charset="0"/>
+              </a:rPr>
+              <a:t>人員：工程師</a:t>
+            </a:r>
+          </a:p>
+          <a:p>
+            <a:r>
+              <a:rPr lang="zh-TW" altLang="en-US" sz="3000" dirty="0">
+                <a:latin typeface="+mj-ea"/>
+                <a:ea typeface="+mj-ea"/>
+                <a:cs typeface="Times New Roman" panose="02020603050405020304" pitchFamily="18" charset="0"/>
+              </a:rPr>
+              <a:t>時間：</a:t>
+            </a:r>
+            <a:r>
+              <a:rPr lang="en-US" altLang="zh-TW" sz="3000" dirty="0">
+                <a:latin typeface="+mj-ea"/>
+                <a:ea typeface="+mj-ea"/>
+                <a:cs typeface="Times New Roman" panose="02020603050405020304" pitchFamily="18" charset="0"/>
+              </a:rPr>
+              <a:t>commit</a:t>
+            </a:r>
+            <a:r>
+              <a:rPr lang="zh-TW" altLang="en-US" sz="3000" dirty="0">
+                <a:latin typeface="+mj-ea"/>
+                <a:ea typeface="+mj-ea"/>
+                <a:cs typeface="Times New Roman" panose="02020603050405020304" pitchFamily="18" charset="0"/>
+              </a:rPr>
+              <a:t>前</a:t>
+            </a:r>
+          </a:p>
+          <a:p>
+            <a:r>
+              <a:rPr lang="zh-TW" altLang="en-US" sz="3000" dirty="0">
+                <a:latin typeface="+mj-ea"/>
+                <a:ea typeface="+mj-ea"/>
+                <a:cs typeface="Times New Roman" panose="02020603050405020304" pitchFamily="18" charset="0"/>
+              </a:rPr>
+              <a:t>標準：</a:t>
+            </a:r>
+            <a:r>
+              <a:rPr lang="en-US" altLang="zh-TW" sz="3000" dirty="0">
+                <a:latin typeface="+mj-ea"/>
+                <a:ea typeface="+mj-ea"/>
+                <a:cs typeface="Times New Roman" panose="02020603050405020304" pitchFamily="18" charset="0"/>
+              </a:rPr>
+              <a:t>UI</a:t>
+            </a:r>
+            <a:r>
+              <a:rPr lang="zh-TW" altLang="en-US" sz="3000" dirty="0">
+                <a:latin typeface="+mj-ea"/>
+                <a:ea typeface="+mj-ea"/>
+                <a:cs typeface="Times New Roman" panose="02020603050405020304" pitchFamily="18" charset="0"/>
+              </a:rPr>
+              <a:t>正常、設計功能正常，之前完成的部分也都正常</a:t>
+            </a:r>
+          </a:p>
+          <a:p>
+            <a:endParaRPr lang="zh-TW" altLang="en-US" sz="3000" dirty="0">
+              <a:latin typeface="+mj-ea"/>
+              <a:ea typeface="+mj-ea"/>
+              <a:cs typeface="Times New Roman" panose="02020603050405020304" pitchFamily="18" charset="0"/>
+            </a:endParaRPr>
+          </a:p>
+          <a:p>
+            <a:r>
+              <a:rPr lang="en-US" altLang="zh-TW" sz="3000" dirty="0">
+                <a:latin typeface="+mj-ea"/>
+                <a:ea typeface="+mj-ea"/>
+                <a:cs typeface="Times New Roman" panose="02020603050405020304" pitchFamily="18" charset="0"/>
+              </a:rPr>
+              <a:t>CICD</a:t>
+            </a:r>
+            <a:r>
+              <a:rPr lang="zh-TW" altLang="en-US" sz="3000" dirty="0">
+                <a:latin typeface="+mj-ea"/>
+                <a:ea typeface="+mj-ea"/>
+                <a:cs typeface="Times New Roman" panose="02020603050405020304" pitchFamily="18" charset="0"/>
+              </a:rPr>
+              <a:t>自動測試</a:t>
+            </a:r>
+          </a:p>
+          <a:p>
+            <a:r>
+              <a:rPr lang="zh-TW" altLang="en-US" sz="3000" dirty="0">
+                <a:latin typeface="+mj-ea"/>
+                <a:ea typeface="+mj-ea"/>
+                <a:cs typeface="Times New Roman" panose="02020603050405020304" pitchFamily="18" charset="0"/>
+              </a:rPr>
+              <a:t>時間：</a:t>
+            </a:r>
+            <a:r>
+              <a:rPr lang="en-US" altLang="zh-TW" sz="3000" dirty="0">
+                <a:latin typeface="+mj-ea"/>
+                <a:ea typeface="+mj-ea"/>
+                <a:cs typeface="Times New Roman" panose="02020603050405020304" pitchFamily="18" charset="0"/>
+              </a:rPr>
+              <a:t>push</a:t>
+            </a:r>
+            <a:r>
+              <a:rPr lang="zh-TW" altLang="en-US" sz="3000" dirty="0">
+                <a:latin typeface="+mj-ea"/>
+                <a:ea typeface="+mj-ea"/>
+                <a:cs typeface="Times New Roman" panose="02020603050405020304" pitchFamily="18" charset="0"/>
+              </a:rPr>
+              <a:t>到</a:t>
+            </a:r>
+            <a:r>
+              <a:rPr lang="en-US" altLang="zh-TW" sz="3000" dirty="0" err="1">
+                <a:latin typeface="+mj-ea"/>
+                <a:ea typeface="+mj-ea"/>
+                <a:cs typeface="Times New Roman" panose="02020603050405020304" pitchFamily="18" charset="0"/>
+              </a:rPr>
+              <a:t>github</a:t>
+            </a:r>
+            <a:r>
+              <a:rPr lang="zh-TW" altLang="en-US" sz="3000" dirty="0">
+                <a:latin typeface="+mj-ea"/>
+                <a:ea typeface="+mj-ea"/>
+                <a:cs typeface="Times New Roman" panose="02020603050405020304" pitchFamily="18" charset="0"/>
+              </a:rPr>
+              <a:t>後至包版輸出前</a:t>
+            </a:r>
+          </a:p>
+          <a:p>
+            <a:r>
+              <a:rPr lang="zh-TW" altLang="en-US" sz="3000" dirty="0">
+                <a:latin typeface="+mj-ea"/>
+                <a:ea typeface="+mj-ea"/>
+                <a:cs typeface="Times New Roman" panose="02020603050405020304" pitchFamily="18" charset="0"/>
+              </a:rPr>
+              <a:t>標準：測試</a:t>
+            </a:r>
+            <a:r>
+              <a:rPr lang="en-US" altLang="zh-TW" sz="3000" dirty="0">
+                <a:latin typeface="+mj-ea"/>
+                <a:ea typeface="+mj-ea"/>
+                <a:cs typeface="Times New Roman" panose="02020603050405020304" pitchFamily="18" charset="0"/>
+              </a:rPr>
+              <a:t>all pass</a:t>
+            </a:r>
+          </a:p>
+          <a:p>
+            <a:endParaRPr lang="en-US" altLang="zh-TW" sz="3000" dirty="0">
+              <a:latin typeface="+mj-ea"/>
+              <a:ea typeface="+mj-ea"/>
+              <a:cs typeface="Times New Roman" panose="02020603050405020304" pitchFamily="18" charset="0"/>
+            </a:endParaRPr>
+          </a:p>
+          <a:p>
+            <a:r>
+              <a:rPr lang="zh-TW" altLang="en-US" sz="3000" dirty="0">
+                <a:latin typeface="+mj-ea"/>
+                <a:ea typeface="+mj-ea"/>
+                <a:cs typeface="Times New Roman" panose="02020603050405020304" pitchFamily="18" charset="0"/>
+              </a:rPr>
+              <a:t>內部測試</a:t>
+            </a:r>
+          </a:p>
+          <a:p>
+            <a:r>
+              <a:rPr lang="zh-TW" altLang="en-US" sz="3000" dirty="0">
+                <a:latin typeface="+mj-ea"/>
+                <a:ea typeface="+mj-ea"/>
+                <a:cs typeface="Times New Roman" panose="02020603050405020304" pitchFamily="18" charset="0"/>
+              </a:rPr>
+              <a:t>於</a:t>
+            </a:r>
+            <a:r>
+              <a:rPr lang="en-US" altLang="zh-TW" sz="3000" dirty="0">
+                <a:latin typeface="+mj-ea"/>
+                <a:ea typeface="+mj-ea"/>
+                <a:cs typeface="Times New Roman" panose="02020603050405020304" pitchFamily="18" charset="0"/>
+              </a:rPr>
+              <a:t>Play Console</a:t>
+            </a:r>
+            <a:r>
+              <a:rPr lang="zh-TW" altLang="en-US" sz="3000" dirty="0">
+                <a:latin typeface="+mj-ea"/>
+                <a:ea typeface="+mj-ea"/>
+                <a:cs typeface="Times New Roman" panose="02020603050405020304" pitchFamily="18" charset="0"/>
+              </a:rPr>
+              <a:t>建立內部測試群組</a:t>
+            </a:r>
+          </a:p>
+          <a:p>
+            <a:r>
+              <a:rPr lang="zh-TW" altLang="en-US" sz="3000" dirty="0">
+                <a:latin typeface="+mj-ea"/>
+                <a:ea typeface="+mj-ea"/>
+                <a:cs typeface="Times New Roman" panose="02020603050405020304" pitchFamily="18" charset="0"/>
+              </a:rPr>
+              <a:t>版本上傳至內部測試</a:t>
+            </a:r>
+          </a:p>
+          <a:p>
+            <a:r>
+              <a:rPr lang="zh-TW" altLang="en-US" sz="3000" dirty="0">
+                <a:latin typeface="+mj-ea"/>
+                <a:ea typeface="+mj-ea"/>
+                <a:cs typeface="Times New Roman" panose="02020603050405020304" pitchFamily="18" charset="0"/>
+              </a:rPr>
+              <a:t>實際下載觀察使用情況、流程、</a:t>
+            </a:r>
+            <a:r>
+              <a:rPr lang="en-US" altLang="zh-TW" sz="3000" dirty="0">
+                <a:latin typeface="+mj-ea"/>
+                <a:ea typeface="+mj-ea"/>
+                <a:cs typeface="Times New Roman" panose="02020603050405020304" pitchFamily="18" charset="0"/>
+              </a:rPr>
+              <a:t>Bug</a:t>
+            </a:r>
+            <a:r>
+              <a:rPr lang="zh-TW" altLang="en-US" sz="3000" dirty="0">
+                <a:latin typeface="+mj-ea"/>
+                <a:ea typeface="+mj-ea"/>
+                <a:cs typeface="Times New Roman" panose="02020603050405020304" pitchFamily="18" charset="0"/>
+              </a:rPr>
+              <a:t>記錄</a:t>
+            </a:r>
+            <a:endParaRPr lang="en-US" altLang="zh-TW" dirty="0">
+              <a:latin typeface="Times New Roman" panose="02020603050405020304" pitchFamily="18" charset="0"/>
+              <a:cs typeface="Times New Roman" panose="02020603050405020304" pitchFamily="18" charset="0"/>
+            </a:endParaRPr>
+          </a:p>
+          <a:p>
+            <a:endParaRPr lang="en-US" altLang="zh-TW" dirty="0">
+              <a:latin typeface="Times New Roman" panose="02020603050405020304" pitchFamily="18" charset="0"/>
+              <a:cs typeface="Times New Roman" panose="02020603050405020304" pitchFamily="18" charset="0"/>
+            </a:endParaRPr>
           </a:p>
         </p:txBody>
       </p:sp>
     </p:spTree>
     <p:extLst>
       <p:ext uri="{BB962C8B-B14F-4D97-AF65-F5344CB8AC3E}">
-        <p14:creationId xmlns:p14="http://schemas.microsoft.com/office/powerpoint/2010/main" val="1574344660"/>
+        <p14:creationId xmlns:p14="http://schemas.microsoft.com/office/powerpoint/2010/main" val="2825679695"/>
       </p:ext>
     </p:extLst>
   </p:cSld>
@@ -3865,7 +4230,7 @@
           <p:cNvPr id="2" name="標題 1">
             <a:extLst>
               <a:ext uri="{FF2B5EF4-FFF2-40B4-BE49-F238E27FC236}">
-                <a16:creationId xmlns:a16="http://schemas.microsoft.com/office/drawing/2014/main" id="{8B993A50-A82F-C5E1-19BC-8D1DA7F49EC2}"/>
+                <a16:creationId xmlns:a16="http://schemas.microsoft.com/office/drawing/2014/main" id="{BF3D4D15-9F22-C958-76B7-436C770777A3}"/>
               </a:ext>
             </a:extLst>
           </p:cNvPr>
@@ -3883,7 +4248,7 @@
           <a:p>
             <a:r>
               <a:rPr lang="zh-TW" altLang="en-US" dirty="0"/>
-              <a:t>功能設計需求</a:t>
+              <a:t>探討與修正</a:t>
             </a:r>
           </a:p>
         </p:txBody>
@@ -3893,7 +4258,7 @@
           <p:cNvPr id="3" name="內容版面配置區 2">
             <a:extLst>
               <a:ext uri="{FF2B5EF4-FFF2-40B4-BE49-F238E27FC236}">
-                <a16:creationId xmlns:a16="http://schemas.microsoft.com/office/drawing/2014/main" id="{241BEFBF-8024-F6B1-F548-5157BE9DED14}"/>
+                <a16:creationId xmlns:a16="http://schemas.microsoft.com/office/drawing/2014/main" id="{A8E4229B-B7FE-6361-FCA8-E4DA8825178E}"/>
               </a:ext>
             </a:extLst>
           </p:cNvPr>
@@ -3906,17 +4271,122 @@
         </p:nvSpPr>
         <p:spPr/>
         <p:txBody>
-          <a:bodyPr/>
-          <a:lstStyle/>
-          <a:p>
-            <a:endParaRPr lang="zh-TW" altLang="en-US"/>
+          <a:bodyPr>
+            <a:normAutofit fontScale="77500" lnSpcReduction="20000"/>
+          </a:bodyPr>
+          <a:lstStyle/>
+          <a:p>
+            <a:r>
+              <a:rPr lang="zh-TW" altLang="en-US" dirty="0"/>
+              <a:t>因使用流程不順，棄用原設計主畫面，直接進入分類頁面</a:t>
+            </a:r>
+          </a:p>
+          <a:p>
+            <a:r>
+              <a:rPr lang="zh-TW" altLang="en-US" dirty="0"/>
+              <a:t>關閉顯示功能已足以讓使用者自行截圖，去除截圖功能設計</a:t>
+            </a:r>
+          </a:p>
+          <a:p>
+            <a:r>
+              <a:rPr lang="zh-TW" altLang="en-US" dirty="0"/>
+              <a:t>分類內含分類的設計，在使用關連資料時，結構過度複雜，改用非關連式設計</a:t>
+            </a:r>
+          </a:p>
+          <a:p>
+            <a:r>
+              <a:rPr lang="zh-TW" altLang="en-US" dirty="0"/>
+              <a:t>將插頁廣告放於使用者切換至圖表頁面時</a:t>
+            </a:r>
+          </a:p>
+          <a:p>
+            <a:r>
+              <a:rPr lang="zh-TW" altLang="en-US" dirty="0"/>
+              <a:t>加入底部導列，放入其他需換頁功能</a:t>
+            </a:r>
+          </a:p>
+          <a:p>
+            <a:r>
+              <a:rPr lang="zh-TW" altLang="en-US" dirty="0"/>
+              <a:t>計數器產生時，自動代入隨機顏色</a:t>
+            </a:r>
+          </a:p>
+          <a:p>
+            <a:r>
+              <a:rPr lang="zh-TW" altLang="en-US" dirty="0"/>
+              <a:t>主打自由度</a:t>
+            </a:r>
+            <a:r>
+              <a:rPr lang="en-US" altLang="zh-TW" dirty="0"/>
+              <a:t>(</a:t>
+            </a:r>
+            <a:r>
+              <a:rPr lang="zh-TW" altLang="en-US" dirty="0"/>
+              <a:t>發現市售最大差異點</a:t>
+            </a:r>
+            <a:r>
+              <a:rPr lang="en-US" altLang="zh-TW" dirty="0"/>
+              <a:t>)</a:t>
+            </a:r>
+            <a:r>
+              <a:rPr lang="zh-TW" altLang="en-US" dirty="0"/>
+              <a:t>，更改專案及程式名</a:t>
+            </a:r>
+          </a:p>
+          <a:p>
+            <a:r>
+              <a:rPr lang="zh-TW" altLang="en-US" dirty="0"/>
+              <a:t>引入富文本導致專案</a:t>
+            </a:r>
+            <a:r>
+              <a:rPr lang="en-US" altLang="zh-TW" dirty="0"/>
+              <a:t>Crash</a:t>
+            </a:r>
+            <a:r>
+              <a:rPr lang="zh-TW" altLang="en-US" dirty="0"/>
+              <a:t>，一度暫緩開發</a:t>
+            </a:r>
+          </a:p>
+          <a:p>
+            <a:r>
+              <a:rPr lang="zh-TW" altLang="en-US" dirty="0"/>
+              <a:t>多次修正</a:t>
+            </a:r>
+            <a:r>
+              <a:rPr lang="en-US" altLang="zh-TW" dirty="0"/>
+              <a:t>CICD</a:t>
+            </a:r>
+            <a:r>
+              <a:rPr lang="zh-TW" altLang="en-US" dirty="0"/>
+              <a:t>設定</a:t>
+            </a:r>
+          </a:p>
+          <a:p>
+            <a:r>
+              <a:rPr lang="zh-TW" altLang="en-US" dirty="0"/>
+              <a:t>暫緩上傳</a:t>
+            </a:r>
+            <a:r>
+              <a:rPr lang="en-US" altLang="zh-TW" dirty="0"/>
+              <a:t>Google</a:t>
+            </a:r>
+            <a:r>
+              <a:rPr lang="zh-TW" altLang="en-US" dirty="0"/>
+              <a:t>雲端功能，先行確保檔案匯出的開發順利</a:t>
+            </a:r>
+          </a:p>
+          <a:p>
+            <a:r>
+              <a:rPr lang="zh-TW" altLang="en-US" dirty="0"/>
+              <a:t>要求加入多國語系</a:t>
+            </a:r>
           </a:p>
         </p:txBody>
       </p:sp>
     </p:spTree>
     <p:extLst>
       <p:ext uri="{BB962C8B-B14F-4D97-AF65-F5344CB8AC3E}">
-        <p14:creationId xmlns:p14="http://schemas.microsoft.com/office/powerpoint/2010/main" val="2811906351"/>
+        <p14:creationId xmlns:p14="http://schemas.microsoft.com/office/powerpoint/2010/main" val="2747247060"/>
       </p:ext>
     </p:extLst>
   </p:cSld>
@@ -3948,7 +4418,7 @@
           <p:cNvPr id="2" name="標題 1">
             <a:extLst>
               <a:ext uri="{FF2B5EF4-FFF2-40B4-BE49-F238E27FC236}">
-                <a16:creationId xmlns:a16="http://schemas.microsoft.com/office/drawing/2014/main" id="{B238951C-B2BE-D3BA-28AD-965158C1CDDB}"/>
+                <a16:creationId xmlns:a16="http://schemas.microsoft.com/office/drawing/2014/main" id="{C1736E66-4AA0-8630-52E6-3F3F9CBC3630}"/>
               </a:ext>
             </a:extLst>
           </p:cNvPr>
@@ -3965,18 +4435,8 @@
           <a:lstStyle/>
           <a:p>
             <a:r>
-              <a:rPr lang="en-US" altLang="zh-TW" dirty="0">
-                <a:latin typeface="Times New Roman" panose="02020603050405020304" pitchFamily="18" charset="0"/>
-                <a:cs typeface="Times New Roman" panose="02020603050405020304" pitchFamily="18" charset="0"/>
-              </a:rPr>
-              <a:t>UI/UX</a:t>
-            </a:r>
-            <a:r>
-              <a:rPr lang="zh-TW" altLang="en-US" dirty="0">
-                <a:latin typeface="Times New Roman" panose="02020603050405020304" pitchFamily="18" charset="0"/>
-                <a:cs typeface="Times New Roman" panose="02020603050405020304" pitchFamily="18" charset="0"/>
-              </a:rPr>
-              <a:t>設計</a:t>
+              <a:rPr lang="zh-TW" altLang="en-US" dirty="0"/>
+              <a:t>持續整合與發布</a:t>
             </a:r>
           </a:p>
         </p:txBody>
@@ -3986,7 +4446,7 @@
           <p:cNvPr id="3" name="內容版面配置區 2">
             <a:extLst>
               <a:ext uri="{FF2B5EF4-FFF2-40B4-BE49-F238E27FC236}">
-                <a16:creationId xmlns:a16="http://schemas.microsoft.com/office/drawing/2014/main" id="{E6250D7C-EF29-5124-EEE5-8C3A22027EB0}"/>
+                <a16:creationId xmlns:a16="http://schemas.microsoft.com/office/drawing/2014/main" id="{7E8CD09B-D28C-660F-C4C5-62C76BA73728}"/>
               </a:ext>
             </a:extLst>
           </p:cNvPr>
@@ -4004,15 +4464,63 @@
           <a:p>
             <a:r>
               <a:rPr lang="zh-TW" altLang="en-US" dirty="0"/>
-              <a:t>設計</a:t>
-            </a:r>
-          </a:p>
-        </p:txBody>
-      </p:sp>
+              <a:t>使用 </a:t>
+            </a:r>
+            <a:r>
+              <a:rPr lang="en-US" altLang="zh-TW" dirty="0" err="1"/>
+              <a:t>Codemagic</a:t>
+            </a:r>
+            <a:r>
+              <a:rPr lang="zh-TW" altLang="en-US" dirty="0"/>
+              <a:t>平台實作 </a:t>
+            </a:r>
+            <a:r>
+              <a:rPr lang="en-US" altLang="zh-TW" dirty="0"/>
+              <a:t>CI/CD</a:t>
+            </a:r>
+          </a:p>
+          <a:p>
+            <a:endParaRPr lang="en-US" altLang="zh-TW" dirty="0"/>
+          </a:p>
+          <a:p>
+            <a:endParaRPr lang="zh-TW" altLang="en-US" dirty="0"/>
+          </a:p>
+        </p:txBody>
+      </p:sp>
+      <p:pic>
+        <p:nvPicPr>
+          <p:cNvPr id="5" name="圖片 4">
+            <a:extLst>
+              <a:ext uri="{FF2B5EF4-FFF2-40B4-BE49-F238E27FC236}">
+                <a16:creationId xmlns:a16="http://schemas.microsoft.com/office/drawing/2014/main" id="{DFB24B64-DDFB-238D-CD84-FEFE2AFFCF24}"/>
+              </a:ext>
+            </a:extLst>
+          </p:cNvPr>
+          <p:cNvPicPr>
+            <a:picLocks noChangeAspect="1"/>
+          </p:cNvPicPr>
+          <p:nvPr/>
+        </p:nvPicPr>
+        <p:blipFill>
+          <a:blip r:embed="rId2"/>
+          <a:stretch>
+            <a:fillRect/>
+          </a:stretch>
+        </p:blipFill>
+        <p:spPr>
+          <a:xfrm>
+            <a:off x="2851332" y="2393850"/>
+            <a:ext cx="7392600" cy="3452382"/>
+          </a:xfrm>
+          <a:prstGeom prst="rect">
+            <a:avLst/>
+          </a:prstGeom>
+        </p:spPr>
+      </p:pic>
     </p:spTree>
     <p:extLst>
       <p:ext uri="{BB962C8B-B14F-4D97-AF65-F5344CB8AC3E}">
-        <p14:creationId xmlns:p14="http://schemas.microsoft.com/office/powerpoint/2010/main" val="3410084418"/>
+        <p14:creationId xmlns:p14="http://schemas.microsoft.com/office/powerpoint/2010/main" val="3590614639"/>
       </p:ext>
     </p:extLst>
   </p:cSld>
@@ -4039,12 +4547,41 @@
           <a:chExt cx="0" cy="0"/>
         </a:xfrm>
       </p:grpSpPr>
+      <p:pic>
+        <p:nvPicPr>
+          <p:cNvPr id="7" name="圖片 6">
+            <a:extLst>
+              <a:ext uri="{FF2B5EF4-FFF2-40B4-BE49-F238E27FC236}">
+                <a16:creationId xmlns:a16="http://schemas.microsoft.com/office/drawing/2014/main" id="{FA2D2152-816E-DDD9-6D8F-771A5F1A3601}"/>
+              </a:ext>
+            </a:extLst>
+          </p:cNvPr>
+          <p:cNvPicPr>
+            <a:picLocks noChangeAspect="1"/>
+          </p:cNvPicPr>
+          <p:nvPr/>
+        </p:nvPicPr>
+        <p:blipFill rotWithShape="1">
+          <a:blip r:embed="rId2"/>
+          <a:srcRect t="11729"/>
+          <a:stretch/>
+        </p:blipFill>
+        <p:spPr>
+          <a:xfrm>
+            <a:off x="1470991" y="1520597"/>
+            <a:ext cx="9250017" cy="4907745"/>
+          </a:xfrm>
+          <a:prstGeom prst="rect">
+            <a:avLst/>
+          </a:prstGeom>
+        </p:spPr>
+      </p:pic>
       <p:sp>
         <p:nvSpPr>
           <p:cNvPr id="2" name="標題 1">
             <a:extLst>
               <a:ext uri="{FF2B5EF4-FFF2-40B4-BE49-F238E27FC236}">
-                <a16:creationId xmlns:a16="http://schemas.microsoft.com/office/drawing/2014/main" id="{D59C02C9-CD06-3F3A-13A9-7BF8AB30AE7D}"/>
+                <a16:creationId xmlns:a16="http://schemas.microsoft.com/office/drawing/2014/main" id="{23281FBA-B587-D84F-A45D-3A84C7A13A52}"/>
               </a:ext>
             </a:extLst>
           </p:cNvPr>
@@ -4061,56 +4598,16 @@
           <a:lstStyle/>
           <a:p>
             <a:r>
-              <a:rPr lang="en-US" altLang="zh-TW" dirty="0">
-                <a:latin typeface="Times New Roman" panose="02020603050405020304" pitchFamily="18" charset="0"/>
-                <a:cs typeface="Times New Roman" panose="02020603050405020304" pitchFamily="18" charset="0"/>
-              </a:rPr>
-              <a:t>UI/UX</a:t>
-            </a:r>
-            <a:r>
-              <a:rPr lang="zh-TW" altLang="en-US" dirty="0">
-                <a:latin typeface="Times New Roman" panose="02020603050405020304" pitchFamily="18" charset="0"/>
-                <a:cs typeface="Times New Roman" panose="02020603050405020304" pitchFamily="18" charset="0"/>
-              </a:rPr>
-              <a:t>設計</a:t>
-            </a:r>
-            <a:endParaRPr lang="zh-TW" altLang="en-US" dirty="0"/>
-          </a:p>
-        </p:txBody>
-      </p:sp>
-      <p:sp>
-        <p:nvSpPr>
-          <p:cNvPr id="3" name="內容版面配置區 2">
-            <a:extLst>
-              <a:ext uri="{FF2B5EF4-FFF2-40B4-BE49-F238E27FC236}">
-                <a16:creationId xmlns:a16="http://schemas.microsoft.com/office/drawing/2014/main" id="{9632879A-D0B0-BF66-4EE1-50079F552EAD}"/>
-              </a:ext>
-            </a:extLst>
-          </p:cNvPr>
-          <p:cNvSpPr>
-            <a:spLocks noGrp="1"/>
-          </p:cNvSpPr>
-          <p:nvPr>
-            <p:ph idx="1"/>
-          </p:nvPr>
-        </p:nvSpPr>
-        <p:spPr/>
-        <p:txBody>
-          <a:bodyPr/>
-          <a:lstStyle/>
-          <a:p>
-            <a:r>
-              <a:rPr lang="en-US" altLang="zh-TW" dirty="0"/>
-              <a:t>Wireframe</a:t>
-            </a:r>
-            <a:endParaRPr lang="zh-TW" altLang="en-US" dirty="0"/>
+              <a:rPr lang="zh-TW" altLang="en-US" dirty="0"/>
+              <a:t>時程與甘特圖</a:t>
+            </a:r>
           </a:p>
         </p:txBody>
       </p:sp>
     </p:spTree>
     <p:extLst>
       <p:ext uri="{BB962C8B-B14F-4D97-AF65-F5344CB8AC3E}">
-        <p14:creationId xmlns:p14="http://schemas.microsoft.com/office/powerpoint/2010/main" val="1075990451"/>
+        <p14:creationId xmlns:p14="http://schemas.microsoft.com/office/powerpoint/2010/main" val="53425777"/>
       </p:ext>
     </p:extLst>
   </p:cSld>
@@ -4142,7 +4639,7 @@
           <p:cNvPr id="2" name="標題 1">
             <a:extLst>
               <a:ext uri="{FF2B5EF4-FFF2-40B4-BE49-F238E27FC236}">
-                <a16:creationId xmlns:a16="http://schemas.microsoft.com/office/drawing/2014/main" id="{AC3EF7B4-5F3D-57BB-7ECB-21D91D95E606}"/>
+                <a16:creationId xmlns:a16="http://schemas.microsoft.com/office/drawing/2014/main" id="{DA7A0BCD-09A3-8E76-ECBD-7AA64B469DFA}"/>
               </a:ext>
             </a:extLst>
           </p:cNvPr>
@@ -4160,7 +4657,7 @@
           <a:p>
             <a:r>
               <a:rPr lang="zh-TW" altLang="en-US" dirty="0"/>
-              <a:t>程式原型</a:t>
+              <a:t>成果展示</a:t>
             </a:r>
           </a:p>
         </p:txBody>
@@ -4170,7 +4667,7 @@
           <p:cNvPr id="3" name="內容版面配置區 2">
             <a:extLst>
               <a:ext uri="{FF2B5EF4-FFF2-40B4-BE49-F238E27FC236}">
-                <a16:creationId xmlns:a16="http://schemas.microsoft.com/office/drawing/2014/main" id="{E8643B3B-1400-129A-5421-89D9E30D4E61}"/>
+                <a16:creationId xmlns:a16="http://schemas.microsoft.com/office/drawing/2014/main" id="{496EBEF3-ABE1-6166-E43C-CF90852C803D}"/>
               </a:ext>
             </a:extLst>
           </p:cNvPr>
@@ -4186,14 +4683,18 @@
           <a:bodyPr/>
           <a:lstStyle/>
           <a:p>
-            <a:endParaRPr lang="zh-TW" altLang="en-US"/>
+            <a:r>
+              <a:rPr lang="en-US" altLang="zh-TW" dirty="0"/>
+              <a:t>Publish On Google Play</a:t>
+            </a:r>
+            <a:endParaRPr lang="zh-TW" altLang="en-US" dirty="0"/>
           </a:p>
         </p:txBody>
       </p:sp>
     </p:spTree>
     <p:extLst>
       <p:ext uri="{BB962C8B-B14F-4D97-AF65-F5344CB8AC3E}">
-        <p14:creationId xmlns:p14="http://schemas.microsoft.com/office/powerpoint/2010/main" val="3003354785"/>
+        <p14:creationId xmlns:p14="http://schemas.microsoft.com/office/powerpoint/2010/main" val="23587638"/>
       </p:ext>
     </p:extLst>
   </p:cSld>
@@ -4220,63 +4721,182 @@
           <a:chExt cx="0" cy="0"/>
         </a:xfrm>
       </p:grpSpPr>
-      <p:sp>
-        <p:nvSpPr>
-          <p:cNvPr id="2" name="標題 1">
-            <a:extLst>
-              <a:ext uri="{FF2B5EF4-FFF2-40B4-BE49-F238E27FC236}">
-                <a16:creationId xmlns:a16="http://schemas.microsoft.com/office/drawing/2014/main" id="{BF3D4D15-9F22-C958-76B7-436C770777A3}"/>
-              </a:ext>
-            </a:extLst>
-          </p:cNvPr>
-          <p:cNvSpPr>
-            <a:spLocks noGrp="1"/>
-          </p:cNvSpPr>
-          <p:nvPr>
-            <p:ph type="title"/>
-          </p:nvPr>
-        </p:nvSpPr>
-        <p:spPr/>
-        <p:txBody>
-          <a:bodyPr/>
-          <a:lstStyle/>
-          <a:p>
-            <a:r>
-              <a:rPr lang="zh-TW" altLang="en-US" dirty="0"/>
-              <a:t>探討與修正</a:t>
-            </a:r>
-          </a:p>
-        </p:txBody>
-      </p:sp>
-      <p:sp>
-        <p:nvSpPr>
-          <p:cNvPr id="3" name="內容版面配置區 2">
-            <a:extLst>
-              <a:ext uri="{FF2B5EF4-FFF2-40B4-BE49-F238E27FC236}">
-                <a16:creationId xmlns:a16="http://schemas.microsoft.com/office/drawing/2014/main" id="{A8E4229B-B7FE-6361-FCA8-E4DA8825178E}"/>
-              </a:ext>
-            </a:extLst>
-          </p:cNvPr>
-          <p:cNvSpPr>
-            <a:spLocks noGrp="1"/>
-          </p:cNvSpPr>
-          <p:nvPr>
-            <p:ph idx="1"/>
-          </p:nvPr>
-        </p:nvSpPr>
-        <p:spPr/>
-        <p:txBody>
-          <a:bodyPr/>
-          <a:lstStyle/>
-          <a:p>
-            <a:endParaRPr lang="zh-TW" altLang="en-US"/>
-          </a:p>
-        </p:txBody>
-      </p:sp>
+      <p:pic>
+        <p:nvPicPr>
+          <p:cNvPr id="13" name="圖片 12">
+            <a:extLst>
+              <a:ext uri="{FF2B5EF4-FFF2-40B4-BE49-F238E27FC236}">
+                <a16:creationId xmlns:a16="http://schemas.microsoft.com/office/drawing/2014/main" id="{7AA3708D-BBC5-3B51-87FC-988D7941D5DD}"/>
+              </a:ext>
+            </a:extLst>
+          </p:cNvPr>
+          <p:cNvPicPr>
+            <a:picLocks noChangeAspect="1"/>
+          </p:cNvPicPr>
+          <p:nvPr/>
+        </p:nvPicPr>
+        <p:blipFill>
+          <a:blip r:embed="rId2">
+            <a:extLst>
+              <a:ext uri="{28A0092B-C50C-407E-A947-70E740481C1C}">
+                <a14:useLocalDpi xmlns:a14="http://schemas.microsoft.com/office/drawing/2010/main" val="0"/>
+              </a:ext>
+            </a:extLst>
+          </a:blip>
+          <a:stretch>
+            <a:fillRect/>
+          </a:stretch>
+        </p:blipFill>
+        <p:spPr>
+          <a:xfrm>
+            <a:off x="1207437" y="0"/>
+            <a:ext cx="3165231" cy="6858000"/>
+          </a:xfrm>
+          <a:prstGeom prst="rect">
+            <a:avLst/>
+          </a:prstGeom>
+        </p:spPr>
+      </p:pic>
+      <p:grpSp>
+        <p:nvGrpSpPr>
+          <p:cNvPr id="10" name="群組 9">
+            <a:extLst>
+              <a:ext uri="{FF2B5EF4-FFF2-40B4-BE49-F238E27FC236}">
+                <a16:creationId xmlns:a16="http://schemas.microsoft.com/office/drawing/2014/main" id="{6A406587-9E60-1A13-472B-9707E3799C4B}"/>
+              </a:ext>
+            </a:extLst>
+          </p:cNvPr>
+          <p:cNvGrpSpPr/>
+          <p:nvPr/>
+        </p:nvGrpSpPr>
+        <p:grpSpPr>
+          <a:xfrm>
+            <a:off x="4654103" y="0"/>
+            <a:ext cx="3165231" cy="6858000"/>
+            <a:chOff x="1770184" y="0"/>
+            <a:chExt cx="3165231" cy="6858000"/>
+          </a:xfrm>
+        </p:grpSpPr>
+        <p:pic>
+          <p:nvPicPr>
+            <p:cNvPr id="11" name="圖片 10">
+              <a:extLst>
+                <a:ext uri="{FF2B5EF4-FFF2-40B4-BE49-F238E27FC236}">
+                  <a16:creationId xmlns:a16="http://schemas.microsoft.com/office/drawing/2014/main" id="{11EE3B75-3996-1362-A63F-395756D62FC4}"/>
+                </a:ext>
+              </a:extLst>
+            </p:cNvPr>
+            <p:cNvPicPr>
+              <a:picLocks noChangeAspect="1"/>
+            </p:cNvPicPr>
+            <p:nvPr/>
+          </p:nvPicPr>
+          <p:blipFill>
+            <a:blip r:embed="rId3">
+              <a:extLst>
+                <a:ext uri="{28A0092B-C50C-407E-A947-70E740481C1C}">
+                  <a14:useLocalDpi xmlns:a14="http://schemas.microsoft.com/office/drawing/2010/main" val="0"/>
+                </a:ext>
+              </a:extLst>
+            </a:blip>
+            <a:stretch>
+              <a:fillRect/>
+            </a:stretch>
+          </p:blipFill>
+          <p:spPr>
+            <a:xfrm>
+              <a:off x="1770184" y="0"/>
+              <a:ext cx="3165231" cy="6858000"/>
+            </a:xfrm>
+            <a:prstGeom prst="rect">
+              <a:avLst/>
+            </a:prstGeom>
+          </p:spPr>
+        </p:pic>
+        <p:cxnSp>
+          <p:nvCxnSpPr>
+            <p:cNvPr id="12" name="直線單箭頭接點 11">
+              <a:extLst>
+                <a:ext uri="{FF2B5EF4-FFF2-40B4-BE49-F238E27FC236}">
+                  <a16:creationId xmlns:a16="http://schemas.microsoft.com/office/drawing/2014/main" id="{DA5716A3-EAE3-46A1-80B0-DBC4633A77EE}"/>
+                </a:ext>
+              </a:extLst>
+            </p:cNvPr>
+            <p:cNvCxnSpPr/>
+            <p:nvPr/>
+          </p:nvCxnSpPr>
+          <p:spPr>
+            <a:xfrm flipV="1">
+              <a:off x="2984500" y="1790700"/>
+              <a:ext cx="812800" cy="317500"/>
+            </a:xfrm>
+            <a:prstGeom prst="straightConnector1">
+              <a:avLst/>
+            </a:prstGeom>
+            <a:ln w="57150">
+              <a:solidFill>
+                <a:srgbClr val="FF0000"/>
+              </a:solidFill>
+              <a:headEnd type="triangle"/>
+              <a:tailEnd type="triangle"/>
+            </a:ln>
+          </p:spPr>
+          <p:style>
+            <a:lnRef idx="1">
+              <a:schemeClr val="accent2"/>
+            </a:lnRef>
+            <a:fillRef idx="0">
+              <a:schemeClr val="accent2"/>
+            </a:fillRef>
+            <a:effectRef idx="0">
+              <a:schemeClr val="accent2"/>
+            </a:effectRef>
+            <a:fontRef idx="minor">
+              <a:schemeClr val="tx1"/>
+            </a:fontRef>
+          </p:style>
+        </p:cxnSp>
+      </p:grpSp>
+      <p:pic>
+        <p:nvPicPr>
+          <p:cNvPr id="14" name="圖片 13">
+            <a:extLst>
+              <a:ext uri="{FF2B5EF4-FFF2-40B4-BE49-F238E27FC236}">
+                <a16:creationId xmlns:a16="http://schemas.microsoft.com/office/drawing/2014/main" id="{71CB2F7A-A158-5706-5046-54956784A0C6}"/>
+              </a:ext>
+            </a:extLst>
+          </p:cNvPr>
+          <p:cNvPicPr>
+            <a:picLocks noChangeAspect="1"/>
+          </p:cNvPicPr>
+          <p:nvPr/>
+        </p:nvPicPr>
+        <p:blipFill>
+          <a:blip r:embed="rId4">
+            <a:extLst>
+              <a:ext uri="{28A0092B-C50C-407E-A947-70E740481C1C}">
+                <a14:useLocalDpi xmlns:a14="http://schemas.microsoft.com/office/drawing/2010/main" val="0"/>
+              </a:ext>
+            </a:extLst>
+          </a:blip>
+          <a:stretch>
+            <a:fillRect/>
+          </a:stretch>
+        </p:blipFill>
+        <p:spPr>
+          <a:xfrm>
+            <a:off x="8119464" y="0"/>
+            <a:ext cx="3165231" cy="6858000"/>
+          </a:xfrm>
+          <a:prstGeom prst="rect">
+            <a:avLst/>
+          </a:prstGeom>
+        </p:spPr>
+      </p:pic>
     </p:spTree>
     <p:extLst>
       <p:ext uri="{BB962C8B-B14F-4D97-AF65-F5344CB8AC3E}">
-        <p14:creationId xmlns:p14="http://schemas.microsoft.com/office/powerpoint/2010/main" val="2747247060"/>
+        <p14:creationId xmlns:p14="http://schemas.microsoft.com/office/powerpoint/2010/main" val="324565548"/>
       </p:ext>
     </p:extLst>
   </p:cSld>
@@ -4303,63 +4923,118 @@
           <a:chExt cx="0" cy="0"/>
         </a:xfrm>
       </p:grpSpPr>
-      <p:sp>
-        <p:nvSpPr>
-          <p:cNvPr id="2" name="標題 1">
-            <a:extLst>
-              <a:ext uri="{FF2B5EF4-FFF2-40B4-BE49-F238E27FC236}">
-                <a16:creationId xmlns:a16="http://schemas.microsoft.com/office/drawing/2014/main" id="{08199279-1731-2237-8CC0-F17EAF776A97}"/>
-              </a:ext>
-            </a:extLst>
-          </p:cNvPr>
-          <p:cNvSpPr>
-            <a:spLocks noGrp="1"/>
-          </p:cNvSpPr>
-          <p:nvPr>
-            <p:ph type="title"/>
-          </p:nvPr>
-        </p:nvSpPr>
-        <p:spPr/>
-        <p:txBody>
-          <a:bodyPr/>
-          <a:lstStyle/>
-          <a:p>
-            <a:r>
-              <a:rPr lang="zh-TW" altLang="en-US" dirty="0"/>
-              <a:t>測試計劃</a:t>
-            </a:r>
-          </a:p>
-        </p:txBody>
-      </p:sp>
-      <p:sp>
-        <p:nvSpPr>
-          <p:cNvPr id="3" name="內容版面配置區 2">
-            <a:extLst>
-              <a:ext uri="{FF2B5EF4-FFF2-40B4-BE49-F238E27FC236}">
-                <a16:creationId xmlns:a16="http://schemas.microsoft.com/office/drawing/2014/main" id="{E5A05B06-3209-2131-F32A-9A6C0869CC09}"/>
-              </a:ext>
-            </a:extLst>
-          </p:cNvPr>
-          <p:cNvSpPr>
-            <a:spLocks noGrp="1"/>
-          </p:cNvSpPr>
-          <p:nvPr>
-            <p:ph idx="1"/>
-          </p:nvPr>
-        </p:nvSpPr>
-        <p:spPr/>
-        <p:txBody>
-          <a:bodyPr/>
-          <a:lstStyle/>
-          <a:p>
-            <a:endParaRPr lang="zh-TW" altLang="en-US"/>
-          </a:p>
-        </p:txBody>
-      </p:sp>
+      <p:pic>
+        <p:nvPicPr>
+          <p:cNvPr id="4" name="圖片 3">
+            <a:extLst>
+              <a:ext uri="{FF2B5EF4-FFF2-40B4-BE49-F238E27FC236}">
+                <a16:creationId xmlns:a16="http://schemas.microsoft.com/office/drawing/2014/main" id="{F800BD2D-ADD9-B327-6C95-91B880F43D0A}"/>
+              </a:ext>
+            </a:extLst>
+          </p:cNvPr>
+          <p:cNvPicPr>
+            <a:picLocks noChangeAspect="1"/>
+          </p:cNvPicPr>
+          <p:nvPr/>
+        </p:nvPicPr>
+        <p:blipFill>
+          <a:blip r:embed="rId2">
+            <a:extLst>
+              <a:ext uri="{28A0092B-C50C-407E-A947-70E740481C1C}">
+                <a14:useLocalDpi xmlns:a14="http://schemas.microsoft.com/office/drawing/2010/main" val="0"/>
+              </a:ext>
+            </a:extLst>
+          </a:blip>
+          <a:stretch>
+            <a:fillRect/>
+          </a:stretch>
+        </p:blipFill>
+        <p:spPr>
+          <a:xfrm>
+            <a:off x="1033584" y="0"/>
+            <a:ext cx="3165231" cy="6858000"/>
+          </a:xfrm>
+          <a:prstGeom prst="rect">
+            <a:avLst/>
+          </a:prstGeom>
+        </p:spPr>
+      </p:pic>
+      <p:pic>
+        <p:nvPicPr>
+          <p:cNvPr id="5" name="圖片 4">
+            <a:extLst>
+              <a:ext uri="{FF2B5EF4-FFF2-40B4-BE49-F238E27FC236}">
+                <a16:creationId xmlns:a16="http://schemas.microsoft.com/office/drawing/2014/main" id="{71E79EF8-966E-2C77-E4FB-83EDED4511A0}"/>
+              </a:ext>
+            </a:extLst>
+          </p:cNvPr>
+          <p:cNvPicPr>
+            <a:picLocks noChangeAspect="1"/>
+          </p:cNvPicPr>
+          <p:nvPr/>
+        </p:nvPicPr>
+        <p:blipFill>
+          <a:blip r:embed="rId3">
+            <a:extLst>
+              <a:ext uri="{28A0092B-C50C-407E-A947-70E740481C1C}">
+                <a14:useLocalDpi xmlns:a14="http://schemas.microsoft.com/office/drawing/2010/main" val="0"/>
+              </a:ext>
+            </a:extLst>
+          </a:blip>
+          <a:stretch>
+            <a:fillRect/>
+          </a:stretch>
+        </p:blipFill>
+        <p:spPr>
+          <a:xfrm>
+            <a:off x="4322884" y="0"/>
+            <a:ext cx="3165231" cy="6858000"/>
+          </a:xfrm>
+          <a:prstGeom prst="rect">
+            <a:avLst/>
+          </a:prstGeom>
+        </p:spPr>
+      </p:pic>
+      <p:pic>
+        <p:nvPicPr>
+          <p:cNvPr id="6" name="圖片 5">
+            <a:extLst>
+              <a:ext uri="{FF2B5EF4-FFF2-40B4-BE49-F238E27FC236}">
+                <a16:creationId xmlns:a16="http://schemas.microsoft.com/office/drawing/2014/main" id="{14D1A9D3-5E29-F244-C7E6-22DFE8AEE107}"/>
+              </a:ext>
+            </a:extLst>
+          </p:cNvPr>
+          <p:cNvPicPr>
+            <a:picLocks noChangeAspect="1"/>
+          </p:cNvPicPr>
+          <p:nvPr/>
+        </p:nvPicPr>
+        <p:blipFill>
+          <a:blip r:embed="rId4">
+            <a:extLst>
+              <a:ext uri="{28A0092B-C50C-407E-A947-70E740481C1C}">
+                <a14:useLocalDpi xmlns:a14="http://schemas.microsoft.com/office/drawing/2010/main" val="0"/>
+              </a:ext>
+            </a:extLst>
+          </a:blip>
+          <a:stretch>
+            <a:fillRect/>
+          </a:stretch>
+        </p:blipFill>
+        <p:spPr>
+          <a:xfrm>
+            <a:off x="7612184" y="0"/>
+            <a:ext cx="3165231" cy="6858000"/>
+          </a:xfrm>
+          <a:prstGeom prst="rect">
+            <a:avLst/>
+          </a:prstGeom>
+        </p:spPr>
+      </p:pic>
     </p:spTree>
     <p:extLst>
       <p:ext uri="{BB962C8B-B14F-4D97-AF65-F5344CB8AC3E}">
-        <p14:creationId xmlns:p14="http://schemas.microsoft.com/office/powerpoint/2010/main" val="2825679695"/>
+        <p14:creationId xmlns:p14="http://schemas.microsoft.com/office/powerpoint/2010/main" val="2936060252"/>
       </p:ext>
     </p:extLst>
   </p:cSld>
@@ -4391,7 +5066,7 @@
           <p:cNvPr id="2" name="標題 1">
             <a:extLst>
               <a:ext uri="{FF2B5EF4-FFF2-40B4-BE49-F238E27FC236}">
-                <a16:creationId xmlns:a16="http://schemas.microsoft.com/office/drawing/2014/main" id="{C1736E66-4AA0-8630-52E6-3F3F9CBC3630}"/>
+                <a16:creationId xmlns:a16="http://schemas.microsoft.com/office/drawing/2014/main" id="{F26E0E62-6FCF-2330-05C9-8147A761A3E2}"/>
               </a:ext>
             </a:extLst>
           </p:cNvPr>
@@ -4402,130 +5077,34 @@
             <p:ph type="title"/>
           </p:nvPr>
         </p:nvSpPr>
-        <p:spPr/>
+        <p:spPr>
+          <a:xfrm>
+            <a:off x="4951343" y="2766218"/>
+            <a:ext cx="2289313" cy="1325563"/>
+          </a:xfrm>
+        </p:spPr>
         <p:txBody>
           <a:bodyPr/>
           <a:lstStyle/>
           <a:p>
             <a:r>
-              <a:rPr lang="zh-TW" altLang="en-US" dirty="0"/>
-              <a:t>持續整合與發布</a:t>
-            </a:r>
-          </a:p>
-        </p:txBody>
-      </p:sp>
-      <p:sp>
-        <p:nvSpPr>
-          <p:cNvPr id="3" name="內容版面配置區 2">
-            <a:extLst>
-              <a:ext uri="{FF2B5EF4-FFF2-40B4-BE49-F238E27FC236}">
-                <a16:creationId xmlns:a16="http://schemas.microsoft.com/office/drawing/2014/main" id="{7E8CD09B-D28C-660F-C4C5-62C76BA73728}"/>
-              </a:ext>
-            </a:extLst>
-          </p:cNvPr>
-          <p:cNvSpPr>
-            <a:spLocks noGrp="1"/>
-          </p:cNvSpPr>
-          <p:nvPr>
-            <p:ph idx="1"/>
-          </p:nvPr>
-        </p:nvSpPr>
-        <p:spPr/>
-        <p:txBody>
-          <a:bodyPr/>
-          <a:lstStyle/>
-          <a:p>
-            <a:endParaRPr lang="zh-TW" altLang="en-US"/>
+              <a:rPr lang="en-US" altLang="zh-TW" dirty="0">
+                <a:latin typeface="Times New Roman" panose="02020603050405020304" pitchFamily="18" charset="0"/>
+                <a:cs typeface="Times New Roman" panose="02020603050405020304" pitchFamily="18" charset="0"/>
+              </a:rPr>
+              <a:t>The End</a:t>
+            </a:r>
+            <a:endParaRPr lang="zh-TW" altLang="en-US" dirty="0">
+              <a:latin typeface="Times New Roman" panose="02020603050405020304" pitchFamily="18" charset="0"/>
+              <a:cs typeface="Times New Roman" panose="02020603050405020304" pitchFamily="18" charset="0"/>
+            </a:endParaRPr>
           </a:p>
         </p:txBody>
       </p:sp>
     </p:spTree>
     <p:extLst>
       <p:ext uri="{BB962C8B-B14F-4D97-AF65-F5344CB8AC3E}">
-        <p14:creationId xmlns:p14="http://schemas.microsoft.com/office/powerpoint/2010/main" val="3590614639"/>
-      </p:ext>
-    </p:extLst>
-  </p:cSld>
-  <p:clrMapOvr>
-    <a:masterClrMapping/>
-  </p:clrMapOvr>
-</p:sld>
-</file>
-
-<file path=ppt/slides/slide19.xml><?xml version="1.0" encoding="utf-8"?>
-<p:sld xmlns:a="http://schemas.openxmlformats.org/drawingml/2006/main" xmlns:r="http://schemas.openxmlformats.org/officeDocument/2006/relationships" xmlns:p="http://schemas.openxmlformats.org/presentationml/2006/main">
-  <p:cSld>
-    <p:spTree>
-      <p:nvGrpSpPr>
-        <p:cNvPr id="1" name=""/>
-        <p:cNvGrpSpPr/>
-        <p:nvPr/>
-      </p:nvGrpSpPr>
-      <p:grpSpPr>
-        <a:xfrm>
-          <a:off x="0" y="0"/>
-          <a:ext cx="0" cy="0"/>
-          <a:chOff x="0" y="0"/>
-          <a:chExt cx="0" cy="0"/>
-        </a:xfrm>
-      </p:grpSpPr>
-      <p:sp>
-        <p:nvSpPr>
-          <p:cNvPr id="2" name="標題 1">
-            <a:extLst>
-              <a:ext uri="{FF2B5EF4-FFF2-40B4-BE49-F238E27FC236}">
-                <a16:creationId xmlns:a16="http://schemas.microsoft.com/office/drawing/2014/main" id="{23281FBA-B587-D84F-A45D-3A84C7A13A52}"/>
-              </a:ext>
-            </a:extLst>
-          </p:cNvPr>
-          <p:cNvSpPr>
-            <a:spLocks noGrp="1"/>
-          </p:cNvSpPr>
-          <p:nvPr>
-            <p:ph type="title"/>
-          </p:nvPr>
-        </p:nvSpPr>
-        <p:spPr/>
-        <p:txBody>
-          <a:bodyPr/>
-          <a:lstStyle/>
-          <a:p>
-            <a:r>
-              <a:rPr lang="zh-TW" altLang="en-US" dirty="0"/>
-              <a:t>時程與甘特圖</a:t>
-            </a:r>
-          </a:p>
-        </p:txBody>
-      </p:sp>
-      <p:sp>
-        <p:nvSpPr>
-          <p:cNvPr id="3" name="內容版面配置區 2">
-            <a:extLst>
-              <a:ext uri="{FF2B5EF4-FFF2-40B4-BE49-F238E27FC236}">
-                <a16:creationId xmlns:a16="http://schemas.microsoft.com/office/drawing/2014/main" id="{357F907F-8687-0005-0628-6EF29D913BBA}"/>
-              </a:ext>
-            </a:extLst>
-          </p:cNvPr>
-          <p:cNvSpPr>
-            <a:spLocks noGrp="1"/>
-          </p:cNvSpPr>
-          <p:nvPr>
-            <p:ph idx="1"/>
-          </p:nvPr>
-        </p:nvSpPr>
-        <p:spPr/>
-        <p:txBody>
-          <a:bodyPr/>
-          <a:lstStyle/>
-          <a:p>
-            <a:endParaRPr lang="zh-TW" altLang="en-US"/>
-          </a:p>
-        </p:txBody>
-      </p:sp>
-    </p:spTree>
-    <p:extLst>
-      <p:ext uri="{BB962C8B-B14F-4D97-AF65-F5344CB8AC3E}">
-        <p14:creationId xmlns:p14="http://schemas.microsoft.com/office/powerpoint/2010/main" val="53425777"/>
+        <p14:creationId xmlns:p14="http://schemas.microsoft.com/office/powerpoint/2010/main" val="948950311"/>
       </p:ext>
     </p:extLst>
   </p:cSld>
@@ -4825,163 +5404,6 @@
     <p:extLst>
       <p:ext uri="{BB962C8B-B14F-4D97-AF65-F5344CB8AC3E}">
         <p14:creationId xmlns:p14="http://schemas.microsoft.com/office/powerpoint/2010/main" val="3916072282"/>
-      </p:ext>
-    </p:extLst>
-  </p:cSld>
-  <p:clrMapOvr>
-    <a:masterClrMapping/>
-  </p:clrMapOvr>
-</p:sld>
-</file>
-
-<file path=ppt/slides/slide20.xml><?xml version="1.0" encoding="utf-8"?>
-<p:sld xmlns:a="http://schemas.openxmlformats.org/drawingml/2006/main" xmlns:r="http://schemas.openxmlformats.org/officeDocument/2006/relationships" xmlns:p="http://schemas.openxmlformats.org/presentationml/2006/main">
-  <p:cSld>
-    <p:spTree>
-      <p:nvGrpSpPr>
-        <p:cNvPr id="1" name=""/>
-        <p:cNvGrpSpPr/>
-        <p:nvPr/>
-      </p:nvGrpSpPr>
-      <p:grpSpPr>
-        <a:xfrm>
-          <a:off x="0" y="0"/>
-          <a:ext cx="0" cy="0"/>
-          <a:chOff x="0" y="0"/>
-          <a:chExt cx="0" cy="0"/>
-        </a:xfrm>
-      </p:grpSpPr>
-      <p:sp>
-        <p:nvSpPr>
-          <p:cNvPr id="2" name="標題 1">
-            <a:extLst>
-              <a:ext uri="{FF2B5EF4-FFF2-40B4-BE49-F238E27FC236}">
-                <a16:creationId xmlns:a16="http://schemas.microsoft.com/office/drawing/2014/main" id="{DA7A0BCD-09A3-8E76-ECBD-7AA64B469DFA}"/>
-              </a:ext>
-            </a:extLst>
-          </p:cNvPr>
-          <p:cNvSpPr>
-            <a:spLocks noGrp="1"/>
-          </p:cNvSpPr>
-          <p:nvPr>
-            <p:ph type="title"/>
-          </p:nvPr>
-        </p:nvSpPr>
-        <p:spPr/>
-        <p:txBody>
-          <a:bodyPr/>
-          <a:lstStyle/>
-          <a:p>
-            <a:r>
-              <a:rPr lang="zh-TW" altLang="en-US" dirty="0"/>
-              <a:t>成果展示</a:t>
-            </a:r>
-          </a:p>
-        </p:txBody>
-      </p:sp>
-      <p:sp>
-        <p:nvSpPr>
-          <p:cNvPr id="3" name="內容版面配置區 2">
-            <a:extLst>
-              <a:ext uri="{FF2B5EF4-FFF2-40B4-BE49-F238E27FC236}">
-                <a16:creationId xmlns:a16="http://schemas.microsoft.com/office/drawing/2014/main" id="{496EBEF3-ABE1-6166-E43C-CF90852C803D}"/>
-              </a:ext>
-            </a:extLst>
-          </p:cNvPr>
-          <p:cNvSpPr>
-            <a:spLocks noGrp="1"/>
-          </p:cNvSpPr>
-          <p:nvPr>
-            <p:ph idx="1"/>
-          </p:nvPr>
-        </p:nvSpPr>
-        <p:spPr/>
-        <p:txBody>
-          <a:bodyPr/>
-          <a:lstStyle/>
-          <a:p>
-            <a:r>
-              <a:rPr lang="en-US" altLang="zh-TW" dirty="0"/>
-              <a:t>Coming Soon?</a:t>
-            </a:r>
-            <a:endParaRPr lang="zh-TW" altLang="en-US" dirty="0"/>
-          </a:p>
-        </p:txBody>
-      </p:sp>
-    </p:spTree>
-    <p:extLst>
-      <p:ext uri="{BB962C8B-B14F-4D97-AF65-F5344CB8AC3E}">
-        <p14:creationId xmlns:p14="http://schemas.microsoft.com/office/powerpoint/2010/main" val="23587638"/>
-      </p:ext>
-    </p:extLst>
-  </p:cSld>
-  <p:clrMapOvr>
-    <a:masterClrMapping/>
-  </p:clrMapOvr>
-</p:sld>
-</file>
-
-<file path=ppt/slides/slide21.xml><?xml version="1.0" encoding="utf-8"?>
-<p:sld xmlns:a="http://schemas.openxmlformats.org/drawingml/2006/main" xmlns:r="http://schemas.openxmlformats.org/officeDocument/2006/relationships" xmlns:p="http://schemas.openxmlformats.org/presentationml/2006/main">
-  <p:cSld>
-    <p:spTree>
-      <p:nvGrpSpPr>
-        <p:cNvPr id="1" name=""/>
-        <p:cNvGrpSpPr/>
-        <p:nvPr/>
-      </p:nvGrpSpPr>
-      <p:grpSpPr>
-        <a:xfrm>
-          <a:off x="0" y="0"/>
-          <a:ext cx="0" cy="0"/>
-          <a:chOff x="0" y="0"/>
-          <a:chExt cx="0" cy="0"/>
-        </a:xfrm>
-      </p:grpSpPr>
-      <p:sp>
-        <p:nvSpPr>
-          <p:cNvPr id="2" name="標題 1">
-            <a:extLst>
-              <a:ext uri="{FF2B5EF4-FFF2-40B4-BE49-F238E27FC236}">
-                <a16:creationId xmlns:a16="http://schemas.microsoft.com/office/drawing/2014/main" id="{F26E0E62-6FCF-2330-05C9-8147A761A3E2}"/>
-              </a:ext>
-            </a:extLst>
-          </p:cNvPr>
-          <p:cNvSpPr>
-            <a:spLocks noGrp="1"/>
-          </p:cNvSpPr>
-          <p:nvPr>
-            <p:ph type="title"/>
-          </p:nvPr>
-        </p:nvSpPr>
-        <p:spPr>
-          <a:xfrm>
-            <a:off x="4951343" y="2766218"/>
-            <a:ext cx="2289313" cy="1325563"/>
-          </a:xfrm>
-        </p:spPr>
-        <p:txBody>
-          <a:bodyPr/>
-          <a:lstStyle/>
-          <a:p>
-            <a:r>
-              <a:rPr lang="en-US" altLang="zh-TW" dirty="0">
-                <a:latin typeface="Times New Roman" panose="02020603050405020304" pitchFamily="18" charset="0"/>
-                <a:cs typeface="Times New Roman" panose="02020603050405020304" pitchFamily="18" charset="0"/>
-              </a:rPr>
-              <a:t>The End</a:t>
-            </a:r>
-            <a:endParaRPr lang="zh-TW" altLang="en-US" dirty="0">
-              <a:latin typeface="Times New Roman" panose="02020603050405020304" pitchFamily="18" charset="0"/>
-              <a:cs typeface="Times New Roman" panose="02020603050405020304" pitchFamily="18" charset="0"/>
-            </a:endParaRPr>
-          </a:p>
-        </p:txBody>
-      </p:sp>
-    </p:spTree>
-    <p:extLst>
-      <p:ext uri="{BB962C8B-B14F-4D97-AF65-F5344CB8AC3E}">
-        <p14:creationId xmlns:p14="http://schemas.microsoft.com/office/powerpoint/2010/main" val="948950311"/>
       </p:ext>
     </p:extLst>
   </p:cSld>
@@ -5917,7 +6339,7 @@
           <p:cNvPr id="2" name="標題 1">
             <a:extLst>
               <a:ext uri="{FF2B5EF4-FFF2-40B4-BE49-F238E27FC236}">
-                <a16:creationId xmlns:a16="http://schemas.microsoft.com/office/drawing/2014/main" id="{889F598B-1E43-A6E1-145A-F4E29929E3FE}"/>
+                <a16:creationId xmlns:a16="http://schemas.microsoft.com/office/drawing/2014/main" id="{B1D47424-459B-E2D9-7BC7-35ABD5E58787}"/>
               </a:ext>
             </a:extLst>
           </p:cNvPr>
@@ -5935,21 +6357,8 @@
           <a:p>
             <a:r>
               <a:rPr lang="zh-TW" altLang="en-US" dirty="0"/>
-              <a:t>使用者流程</a:t>
-            </a:r>
-            <a:r>
-              <a:rPr lang="en-US" altLang="zh-TW" dirty="0"/>
-              <a:t>(</a:t>
-            </a:r>
-            <a:r>
-              <a:rPr lang="zh-TW" altLang="en-US" dirty="0"/>
-              <a:t>故事與功能</a:t>
-            </a:r>
-            <a:r>
-              <a:rPr lang="en-US" altLang="zh-TW" dirty="0"/>
-              <a:t>)</a:t>
-            </a:r>
-            <a:endParaRPr lang="zh-TW" altLang="en-US" dirty="0"/>
+              <a:t>產品設計</a:t>
+            </a:r>
           </a:p>
         </p:txBody>
       </p:sp>
@@ -5958,7 +6367,7 @@
           <p:cNvPr id="3" name="內容版面配置區 2">
             <a:extLst>
               <a:ext uri="{FF2B5EF4-FFF2-40B4-BE49-F238E27FC236}">
-                <a16:creationId xmlns:a16="http://schemas.microsoft.com/office/drawing/2014/main" id="{9693BB44-4F86-347B-593B-2CFFAB99169F}"/>
+                <a16:creationId xmlns:a16="http://schemas.microsoft.com/office/drawing/2014/main" id="{F1DDA1D0-488C-431C-CE31-1F82B2E83A6D}"/>
               </a:ext>
             </a:extLst>
           </p:cNvPr>
@@ -5975,20 +6384,114 @@
           <a:lstStyle/>
           <a:p>
             <a:r>
-              <a:rPr lang="zh-TW" altLang="en-US" dirty="0"/>
-              <a:t>使用者流程</a:t>
-            </a:r>
-            <a:endParaRPr lang="en-US" altLang="zh-TW" dirty="0"/>
-          </a:p>
-          <a:p>
-            <a:endParaRPr lang="zh-TW" altLang="en-US" dirty="0"/>
+              <a:rPr lang="zh-TW" altLang="en-US" dirty="0">
+                <a:latin typeface="Times New Roman" panose="02020603050405020304" pitchFamily="18" charset="0"/>
+                <a:cs typeface="Times New Roman" panose="02020603050405020304" pitchFamily="18" charset="0"/>
+              </a:rPr>
+              <a:t>市售產品</a:t>
+            </a:r>
+            <a:endParaRPr lang="en-US" altLang="zh-TW" dirty="0">
+              <a:latin typeface="Times New Roman" panose="02020603050405020304" pitchFamily="18" charset="0"/>
+              <a:cs typeface="Times New Roman" panose="02020603050405020304" pitchFamily="18" charset="0"/>
+            </a:endParaRPr>
+          </a:p>
+          <a:p>
+            <a:r>
+              <a:rPr lang="en-US" altLang="zh-TW" dirty="0">
+                <a:latin typeface="Times New Roman" panose="02020603050405020304" pitchFamily="18" charset="0"/>
+                <a:cs typeface="Times New Roman" panose="02020603050405020304" pitchFamily="18" charset="0"/>
+              </a:rPr>
+              <a:t>Android</a:t>
+            </a:r>
+            <a:r>
+              <a:rPr lang="zh-TW" altLang="en-US" dirty="0">
+                <a:latin typeface="Times New Roman" panose="02020603050405020304" pitchFamily="18" charset="0"/>
+                <a:cs typeface="Times New Roman" panose="02020603050405020304" pitchFamily="18" charset="0"/>
+              </a:rPr>
+              <a:t>下載量最高：</a:t>
+            </a:r>
+            <a:r>
+              <a:rPr lang="en-US" altLang="zh-TW" dirty="0">
+                <a:latin typeface="Times New Roman" panose="02020603050405020304" pitchFamily="18" charset="0"/>
+                <a:cs typeface="Times New Roman" panose="02020603050405020304" pitchFamily="18" charset="0"/>
+              </a:rPr>
+              <a:t>Counter </a:t>
+            </a:r>
+            <a:r>
+              <a:rPr lang="en-US" altLang="zh-TW" dirty="0" err="1">
+                <a:latin typeface="Times New Roman" panose="02020603050405020304" pitchFamily="18" charset="0"/>
+                <a:cs typeface="Times New Roman" panose="02020603050405020304" pitchFamily="18" charset="0"/>
+              </a:rPr>
+              <a:t>Ux</a:t>
+            </a:r>
+            <a:endParaRPr lang="en-US" altLang="zh-TW" dirty="0">
+              <a:latin typeface="Times New Roman" panose="02020603050405020304" pitchFamily="18" charset="0"/>
+              <a:cs typeface="Times New Roman" panose="02020603050405020304" pitchFamily="18" charset="0"/>
+            </a:endParaRPr>
+          </a:p>
+          <a:p>
+            <a:r>
+              <a:rPr lang="en-US" altLang="zh-TW" dirty="0">
+                <a:latin typeface="Times New Roman" panose="02020603050405020304" pitchFamily="18" charset="0"/>
+                <a:cs typeface="Times New Roman" panose="02020603050405020304" pitchFamily="18" charset="0"/>
+              </a:rPr>
+              <a:t>iOS</a:t>
+            </a:r>
+            <a:r>
+              <a:rPr lang="zh-TW" altLang="en-US" dirty="0">
+                <a:latin typeface="Times New Roman" panose="02020603050405020304" pitchFamily="18" charset="0"/>
+                <a:cs typeface="Times New Roman" panose="02020603050405020304" pitchFamily="18" charset="0"/>
+              </a:rPr>
+              <a:t>下載量最高：</a:t>
+            </a:r>
+            <a:r>
+              <a:rPr lang="en-US" altLang="zh-TW" dirty="0">
+                <a:latin typeface="Times New Roman" panose="02020603050405020304" pitchFamily="18" charset="0"/>
+                <a:cs typeface="Times New Roman" panose="02020603050405020304" pitchFamily="18" charset="0"/>
+              </a:rPr>
+              <a:t>Tally</a:t>
+            </a:r>
+          </a:p>
+          <a:p>
+            <a:r>
+              <a:rPr lang="zh-TW" altLang="en-US" dirty="0">
+                <a:latin typeface="Times New Roman" panose="02020603050405020304" pitchFamily="18" charset="0"/>
+                <a:cs typeface="Times New Roman" panose="02020603050405020304" pitchFamily="18" charset="0"/>
+              </a:rPr>
+              <a:t>目前身邊的人常用：</a:t>
+            </a:r>
+            <a:r>
+              <a:rPr lang="en-US" altLang="zh-TW" dirty="0">
+                <a:latin typeface="Times New Roman" panose="02020603050405020304" pitchFamily="18" charset="0"/>
+                <a:cs typeface="Times New Roman" panose="02020603050405020304" pitchFamily="18" charset="0"/>
+              </a:rPr>
+              <a:t> Smart Counter With Widget</a:t>
+            </a:r>
+            <a:r>
+              <a:rPr lang="zh-TW" altLang="en-US" dirty="0">
+                <a:latin typeface="Times New Roman" panose="02020603050405020304" pitchFamily="18" charset="0"/>
+                <a:cs typeface="Times New Roman" panose="02020603050405020304" pitchFamily="18" charset="0"/>
+              </a:rPr>
+              <a:t>、</a:t>
+            </a:r>
+            <a:r>
+              <a:rPr lang="en-US" altLang="zh-TW" dirty="0" err="1">
+                <a:latin typeface="Times New Roman" panose="02020603050405020304" pitchFamily="18" charset="0"/>
+                <a:cs typeface="Times New Roman" panose="02020603050405020304" pitchFamily="18" charset="0"/>
+              </a:rPr>
+              <a:t>CounTik</a:t>
+            </a:r>
+            <a:endParaRPr lang="zh-TW" altLang="en-US" dirty="0">
+              <a:latin typeface="Times New Roman" panose="02020603050405020304" pitchFamily="18" charset="0"/>
+              <a:cs typeface="Times New Roman" panose="02020603050405020304" pitchFamily="18" charset="0"/>
+            </a:endParaRPr>
           </a:p>
         </p:txBody>
       </p:sp>
     </p:spTree>
     <p:extLst>
       <p:ext uri="{BB962C8B-B14F-4D97-AF65-F5344CB8AC3E}">
-        <p14:creationId xmlns:p14="http://schemas.microsoft.com/office/powerpoint/2010/main" val="3162108557"/>
+        <p14:creationId xmlns:p14="http://schemas.microsoft.com/office/powerpoint/2010/main" val="3702826085"/>
       </p:ext>
     </p:extLst>
   </p:cSld>
@@ -6069,7 +6572,37 @@
                 <a:latin typeface="Times New Roman" panose="02020603050405020304" pitchFamily="18" charset="0"/>
                 <a:cs typeface="Times New Roman" panose="02020603050405020304" pitchFamily="18" charset="0"/>
               </a:rPr>
-              <a:t>市售產品</a:t>
+              <a:t>競品分析</a:t>
+            </a:r>
+            <a:r>
+              <a:rPr lang="en-US" altLang="zh-TW" dirty="0">
+                <a:latin typeface="Times New Roman" panose="02020603050405020304" pitchFamily="18" charset="0"/>
+                <a:cs typeface="Times New Roman" panose="02020603050405020304" pitchFamily="18" charset="0"/>
+              </a:rPr>
+              <a:t>(Android)</a:t>
+            </a:r>
+          </a:p>
+          <a:p>
+            <a:r>
+              <a:rPr lang="en-US" altLang="zh-TW" dirty="0" err="1">
+                <a:latin typeface="Times New Roman" panose="02020603050405020304" pitchFamily="18" charset="0"/>
+                <a:cs typeface="Times New Roman" panose="02020603050405020304" pitchFamily="18" charset="0"/>
+              </a:rPr>
+              <a:t>CounTik</a:t>
+            </a:r>
+            <a:r>
+              <a:rPr lang="en-US" altLang="zh-TW" dirty="0">
+                <a:latin typeface="Times New Roman" panose="02020603050405020304" pitchFamily="18" charset="0"/>
+                <a:cs typeface="Times New Roman" panose="02020603050405020304" pitchFamily="18" charset="0"/>
+              </a:rPr>
+              <a:t> </a:t>
+            </a:r>
+            <a:r>
+              <a:rPr lang="zh-TW" altLang="en-US" dirty="0">
+                <a:latin typeface="Times New Roman" panose="02020603050405020304" pitchFamily="18" charset="0"/>
+                <a:cs typeface="Times New Roman" panose="02020603050405020304" pitchFamily="18" charset="0"/>
+              </a:rPr>
+              <a:t>：</a:t>
             </a:r>
             <a:endParaRPr lang="en-US" altLang="zh-TW" dirty="0">
               <a:latin typeface="Times New Roman" panose="02020603050405020304" pitchFamily="18" charset="0"/>
@@ -6078,32 +6611,25 @@
           </a:p>
           <a:p>
             <a:r>
+              <a:rPr lang="zh-TW" altLang="en-US" dirty="0">
+                <a:latin typeface="Times New Roman" panose="02020603050405020304" pitchFamily="18" charset="0"/>
+                <a:cs typeface="Times New Roman" panose="02020603050405020304" pitchFamily="18" charset="0"/>
+              </a:rPr>
+              <a:t>優點：畫面簡單大方、分類可放照片、設定皆為使用者友善設定、功能切換與計數器本體分開使小畫面也很好看而且不易按錯、可用</a:t>
+            </a:r>
+            <a:r>
               <a:rPr lang="en-US" altLang="zh-TW" dirty="0">
                 <a:latin typeface="Times New Roman" panose="02020603050405020304" pitchFamily="18" charset="0"/>
                 <a:cs typeface="Times New Roman" panose="02020603050405020304" pitchFamily="18" charset="0"/>
               </a:rPr>
-              <a:t>Android</a:t>
+              <a:t>label</a:t>
             </a:r>
             <a:r>
               <a:rPr lang="zh-TW" altLang="en-US" dirty="0">
                 <a:latin typeface="Times New Roman" panose="02020603050405020304" pitchFamily="18" charset="0"/>
                 <a:cs typeface="Times New Roman" panose="02020603050405020304" pitchFamily="18" charset="0"/>
               </a:rPr>
-              <a:t>下載量最高：</a:t>
-            </a:r>
-            <a:r>
-              <a:rPr lang="en-US" altLang="zh-TW" dirty="0">
-                <a:latin typeface="Times New Roman" panose="02020603050405020304" pitchFamily="18" charset="0"/>
-                <a:cs typeface="Times New Roman" panose="02020603050405020304" pitchFamily="18" charset="0"/>
-              </a:rPr>
-              <a:t>Counter </a:t>
-            </a:r>
-            <a:r>
-              <a:rPr lang="en-US" altLang="zh-TW" dirty="0" err="1">
-                <a:latin typeface="Times New Roman" panose="02020603050405020304" pitchFamily="18" charset="0"/>
-                <a:cs typeface="Times New Roman" panose="02020603050405020304" pitchFamily="18" charset="0"/>
-              </a:rPr>
-              <a:t>Ux</a:t>
+              <a:t>進行兩次分類、可移動自定議排列順序、可生成簡易圖表、課金要素少、圖片分享、打包及全複製功能</a:t>
             </a:r>
             <a:endParaRPr lang="en-US" altLang="zh-TW" dirty="0">
               <a:latin typeface="Times New Roman" panose="02020603050405020304" pitchFamily="18" charset="0"/>
@@ -6112,67 +6638,31 @@
           </a:p>
           <a:p>
             <a:r>
-              <a:rPr lang="en-US" altLang="zh-TW" dirty="0">
-                <a:latin typeface="Times New Roman" panose="02020603050405020304" pitchFamily="18" charset="0"/>
-                <a:cs typeface="Times New Roman" panose="02020603050405020304" pitchFamily="18" charset="0"/>
-              </a:rPr>
-              <a:t>iOS</a:t>
-            </a:r>
-            <a:r>
               <a:rPr lang="zh-TW" altLang="en-US" dirty="0">
                 <a:latin typeface="Times New Roman" panose="02020603050405020304" pitchFamily="18" charset="0"/>
                 <a:cs typeface="Times New Roman" panose="02020603050405020304" pitchFamily="18" charset="0"/>
               </a:rPr>
-              <a:t>下載量最高：</a:t>
-            </a:r>
-            <a:r>
-              <a:rPr lang="en-US" altLang="zh-TW" dirty="0">
-                <a:latin typeface="Times New Roman" panose="02020603050405020304" pitchFamily="18" charset="0"/>
-                <a:cs typeface="Times New Roman" panose="02020603050405020304" pitchFamily="18" charset="0"/>
-              </a:rPr>
-              <a:t>Tally</a:t>
-            </a:r>
-          </a:p>
-          <a:p>
-            <a:r>
-              <a:rPr lang="zh-TW" altLang="en-US" dirty="0">
-                <a:latin typeface="Times New Roman" panose="02020603050405020304" pitchFamily="18" charset="0"/>
-                <a:cs typeface="Times New Roman" panose="02020603050405020304" pitchFamily="18" charset="0"/>
-              </a:rPr>
-              <a:t>目前身邊的人常用：</a:t>
-            </a:r>
-            <a:r>
-              <a:rPr lang="en-US" altLang="zh-TW" dirty="0">
-                <a:latin typeface="Times New Roman" panose="02020603050405020304" pitchFamily="18" charset="0"/>
-                <a:cs typeface="Times New Roman" panose="02020603050405020304" pitchFamily="18" charset="0"/>
-              </a:rPr>
-              <a:t> Smart Counter With Widget</a:t>
-            </a:r>
-            <a:r>
-              <a:rPr lang="zh-TW" altLang="en-US" dirty="0">
-                <a:latin typeface="Times New Roman" panose="02020603050405020304" pitchFamily="18" charset="0"/>
-                <a:cs typeface="Times New Roman" panose="02020603050405020304" pitchFamily="18" charset="0"/>
-              </a:rPr>
-              <a:t>、</a:t>
-            </a:r>
-            <a:r>
-              <a:rPr lang="en-US" altLang="zh-TW" dirty="0" err="1">
-                <a:latin typeface="Times New Roman" panose="02020603050405020304" pitchFamily="18" charset="0"/>
-                <a:cs typeface="Times New Roman" panose="02020603050405020304" pitchFamily="18" charset="0"/>
-              </a:rPr>
-              <a:t>CounTik</a:t>
-            </a:r>
+              <a:t>缺點：新增流程較慢、不能自由新增分類或計數器、一次只能刪一個、</a:t>
+            </a:r>
+          </a:p>
+          <a:p>
             <a:endParaRPr lang="zh-TW" altLang="en-US" dirty="0">
               <a:latin typeface="Times New Roman" panose="02020603050405020304" pitchFamily="18" charset="0"/>
               <a:cs typeface="Times New Roman" panose="02020603050405020304" pitchFamily="18" charset="0"/>
             </a:endParaRPr>
           </a:p>
+          <a:p>
+            <a:endParaRPr lang="zh-TW" altLang="en-US" dirty="0">
+              <a:latin typeface="Times New Roman" panose="02020603050405020304" pitchFamily="18" charset="0"/>
+              <a:cs typeface="Times New Roman" panose="02020603050405020304" pitchFamily="18" charset="0"/>
+            </a:endParaRPr>
+          </a:p>
         </p:txBody>
       </p:sp>
     </p:spTree>
     <p:extLst>
       <p:ext uri="{BB962C8B-B14F-4D97-AF65-F5344CB8AC3E}">
-        <p14:creationId xmlns:p14="http://schemas.microsoft.com/office/powerpoint/2010/main" val="3702826085"/>
+        <p14:creationId xmlns:p14="http://schemas.microsoft.com/office/powerpoint/2010/main" val="2576697768"/>
       </p:ext>
     </p:extLst>
   </p:cSld>
@@ -6260,23 +6750,16 @@
                 <a:latin typeface="Times New Roman" panose="02020603050405020304" pitchFamily="18" charset="0"/>
                 <a:cs typeface="Times New Roman" panose="02020603050405020304" pitchFamily="18" charset="0"/>
               </a:rPr>
-              <a:t>(Android)</a:t>
-            </a:r>
-          </a:p>
-          <a:p>
-            <a:r>
-              <a:rPr lang="en-US" altLang="zh-TW" dirty="0" err="1">
-                <a:latin typeface="Times New Roman" panose="02020603050405020304" pitchFamily="18" charset="0"/>
-                <a:cs typeface="Times New Roman" panose="02020603050405020304" pitchFamily="18" charset="0"/>
-              </a:rPr>
-              <a:t>CounTik</a:t>
-            </a:r>
+              <a:t>(iOS)</a:t>
+            </a:r>
+          </a:p>
+          <a:p>
             <a:r>
               <a:rPr lang="en-US" altLang="zh-TW" dirty="0">
                 <a:latin typeface="Times New Roman" panose="02020603050405020304" pitchFamily="18" charset="0"/>
                 <a:cs typeface="Times New Roman" panose="02020603050405020304" pitchFamily="18" charset="0"/>
               </a:rPr>
-              <a:t> </a:t>
+              <a:t>Tally </a:t>
             </a:r>
             <a:r>
               <a:rPr lang="zh-TW" altLang="en-US" dirty="0">
@@ -6296,21 +6779,35 @@
                 <a:latin typeface="Times New Roman" panose="02020603050405020304" pitchFamily="18" charset="0"/>
                 <a:cs typeface="Times New Roman" panose="02020603050405020304" pitchFamily="18" charset="0"/>
               </a:rPr>
-              <a:t>優點：畫面簡單大方、分類可放照片、設定皆為使用者友善設定、功能切換與計數器本體分開使小畫面也很好看而且不易按錯、可用</a:t>
+              <a:t>優點：畫面簡單大方、強大的時間及行程功能、目標達成特效、可加入筆記、多直條圖及週期分析圖表、有不同版面可調、可產生小工具在桌面</a:t>
             </a:r>
             <a:r>
               <a:rPr lang="en-US" altLang="zh-TW" dirty="0">
                 <a:latin typeface="Times New Roman" panose="02020603050405020304" pitchFamily="18" charset="0"/>
                 <a:cs typeface="Times New Roman" panose="02020603050405020304" pitchFamily="18" charset="0"/>
               </a:rPr>
-              <a:t>label</a:t>
+              <a:t>(Widget</a:t>
             </a:r>
             <a:r>
               <a:rPr lang="zh-TW" altLang="en-US" dirty="0">
                 <a:latin typeface="Times New Roman" panose="02020603050405020304" pitchFamily="18" charset="0"/>
                 <a:cs typeface="Times New Roman" panose="02020603050405020304" pitchFamily="18" charset="0"/>
               </a:rPr>
-              <a:t>進行兩次分類、可移動自定議排列順序、可生成簡易圖表、課金要素少、圖片分享、打包及全複製功能</a:t>
+              <a:t>化</a:t>
+            </a:r>
+            <a:r>
+              <a:rPr lang="en-US" altLang="zh-TW" dirty="0">
+                <a:latin typeface="Times New Roman" panose="02020603050405020304" pitchFamily="18" charset="0"/>
+                <a:cs typeface="Times New Roman" panose="02020603050405020304" pitchFamily="18" charset="0"/>
+              </a:rPr>
+              <a:t>)</a:t>
+            </a:r>
+            <a:r>
+              <a:rPr lang="zh-TW" altLang="en-US" dirty="0">
+                <a:latin typeface="Times New Roman" panose="02020603050405020304" pitchFamily="18" charset="0"/>
+                <a:cs typeface="Times New Roman" panose="02020603050405020304" pitchFamily="18" charset="0"/>
+              </a:rPr>
+              <a:t> 、記錄每個動作</a:t>
             </a:r>
             <a:endParaRPr lang="en-US" altLang="zh-TW" dirty="0">
               <a:latin typeface="Times New Roman" panose="02020603050405020304" pitchFamily="18" charset="0"/>
@@ -6323,7 +6820,21 @@
                 <a:latin typeface="Times New Roman" panose="02020603050405020304" pitchFamily="18" charset="0"/>
                 <a:cs typeface="Times New Roman" panose="02020603050405020304" pitchFamily="18" charset="0"/>
               </a:rPr>
-              <a:t>缺點：新增流程較慢、不能自由新增分類或計數器、一次只能刪一個、</a:t>
+              <a:t>缺點：很多意義不明的功能沒說明、一些小</a:t>
+            </a:r>
+            <a:r>
+              <a:rPr lang="en-US" altLang="zh-TW" dirty="0">
+                <a:latin typeface="Times New Roman" panose="02020603050405020304" pitchFamily="18" charset="0"/>
+                <a:cs typeface="Times New Roman" panose="02020603050405020304" pitchFamily="18" charset="0"/>
+              </a:rPr>
+              <a:t>bug</a:t>
+            </a:r>
+            <a:r>
+              <a:rPr lang="zh-TW" altLang="en-US" dirty="0">
+                <a:latin typeface="Times New Roman" panose="02020603050405020304" pitchFamily="18" charset="0"/>
+                <a:cs typeface="Times New Roman" panose="02020603050405020304" pitchFamily="18" charset="0"/>
+              </a:rPr>
+              <a:t>、課金要求較高</a:t>
             </a:r>
           </a:p>
           <a:p>
@@ -6343,7 +6854,7 @@
     </p:spTree>
     <p:extLst>
       <p:ext uri="{BB962C8B-B14F-4D97-AF65-F5344CB8AC3E}">
-        <p14:creationId xmlns:p14="http://schemas.microsoft.com/office/powerpoint/2010/main" val="2576697768"/>
+        <p14:creationId xmlns:p14="http://schemas.microsoft.com/office/powerpoint/2010/main" val="1699865115"/>
       </p:ext>
     </p:extLst>
   </p:cSld>
@@ -6416,126 +6927,176 @@
         </p:nvSpPr>
         <p:spPr/>
         <p:txBody>
-          <a:bodyPr/>
-          <a:lstStyle/>
-          <a:p>
-            <a:r>
-              <a:rPr lang="zh-TW" altLang="en-US" dirty="0">
-                <a:latin typeface="Times New Roman" panose="02020603050405020304" pitchFamily="18" charset="0"/>
-                <a:cs typeface="Times New Roman" panose="02020603050405020304" pitchFamily="18" charset="0"/>
-              </a:rPr>
-              <a:t>競品分析</a:t>
-            </a:r>
-            <a:r>
-              <a:rPr lang="en-US" altLang="zh-TW" dirty="0">
-                <a:latin typeface="Times New Roman" panose="02020603050405020304" pitchFamily="18" charset="0"/>
-                <a:cs typeface="Times New Roman" panose="02020603050405020304" pitchFamily="18" charset="0"/>
-              </a:rPr>
-              <a:t>(iOS)</a:t>
-            </a:r>
-          </a:p>
-          <a:p>
-            <a:r>
-              <a:rPr lang="en-US" altLang="zh-TW" dirty="0">
-                <a:latin typeface="Times New Roman" panose="02020603050405020304" pitchFamily="18" charset="0"/>
-                <a:cs typeface="Times New Roman" panose="02020603050405020304" pitchFamily="18" charset="0"/>
-              </a:rPr>
-              <a:t>Tally </a:t>
-            </a:r>
-            <a:r>
-              <a:rPr lang="zh-TW" altLang="en-US" dirty="0">
-                <a:latin typeface="Times New Roman" panose="02020603050405020304" pitchFamily="18" charset="0"/>
-                <a:cs typeface="Times New Roman" panose="02020603050405020304" pitchFamily="18" charset="0"/>
-              </a:rPr>
-              <a:t>：</a:t>
-            </a:r>
+          <a:bodyPr>
+            <a:normAutofit lnSpcReduction="10000"/>
+          </a:bodyPr>
+          <a:lstStyle/>
+          <a:p>
+            <a:r>
+              <a:rPr lang="zh-TW" altLang="en-US" sz="3000" dirty="0">
+                <a:latin typeface="+mj-ea"/>
+                <a:ea typeface="+mj-ea"/>
+                <a:cs typeface="Times New Roman" panose="02020603050405020304" pitchFamily="18" charset="0"/>
+              </a:rPr>
+              <a:t>預期賣點</a:t>
+            </a:r>
+            <a:endParaRPr lang="en-US" altLang="zh-TW" sz="3000" dirty="0">
+              <a:latin typeface="+mj-ea"/>
+              <a:ea typeface="+mj-ea"/>
+              <a:cs typeface="Times New Roman" panose="02020603050405020304" pitchFamily="18" charset="0"/>
+            </a:endParaRPr>
+          </a:p>
+          <a:p>
+            <a:pPr marL="514350" indent="-514350">
+              <a:buFont typeface="+mj-lt"/>
+              <a:buAutoNum type="arabicPeriod"/>
+            </a:pPr>
+            <a:r>
+              <a:rPr lang="zh-TW" altLang="en-US" sz="2600" dirty="0">
+                <a:latin typeface="Times New Roman" panose="02020603050405020304" pitchFamily="18" charset="0"/>
+                <a:cs typeface="Times New Roman" panose="02020603050405020304" pitchFamily="18" charset="0"/>
+              </a:rPr>
+              <a:t>最快產生計數器</a:t>
+            </a:r>
+          </a:p>
+          <a:p>
+            <a:pPr marL="514350" indent="-514350">
+              <a:buFont typeface="+mj-lt"/>
+              <a:buAutoNum type="arabicPeriod"/>
+            </a:pPr>
+            <a:r>
+              <a:rPr lang="zh-TW" altLang="en-US" sz="2600" dirty="0">
+                <a:latin typeface="Times New Roman" panose="02020603050405020304" pitchFamily="18" charset="0"/>
+                <a:cs typeface="Times New Roman" panose="02020603050405020304" pitchFamily="18" charset="0"/>
+              </a:rPr>
+              <a:t>自動亂數產生顏色</a:t>
+            </a:r>
+          </a:p>
+          <a:p>
+            <a:pPr marL="514350" indent="-514350">
+              <a:buFont typeface="+mj-lt"/>
+              <a:buAutoNum type="arabicPeriod"/>
+            </a:pPr>
+            <a:r>
+              <a:rPr lang="zh-TW" altLang="en-US" sz="2600" dirty="0">
+                <a:latin typeface="Times New Roman" panose="02020603050405020304" pitchFamily="18" charset="0"/>
+                <a:cs typeface="Times New Roman" panose="02020603050405020304" pitchFamily="18" charset="0"/>
+              </a:rPr>
+              <a:t>自由的分類與計數器組合</a:t>
+            </a:r>
+          </a:p>
+          <a:p>
+            <a:pPr marL="514350" indent="-514350">
+              <a:buFont typeface="+mj-lt"/>
+              <a:buAutoNum type="arabicPeriod"/>
+            </a:pPr>
+            <a:r>
+              <a:rPr lang="zh-TW" altLang="en-US" sz="2600" dirty="0">
+                <a:latin typeface="Times New Roman" panose="02020603050405020304" pitchFamily="18" charset="0"/>
+                <a:cs typeface="Times New Roman" panose="02020603050405020304" pitchFamily="18" charset="0"/>
+              </a:rPr>
+              <a:t>好看的自定外觀設計</a:t>
+            </a:r>
+            <a:r>
+              <a:rPr lang="en-US" altLang="zh-TW" sz="2600" dirty="0">
+                <a:latin typeface="Times New Roman" panose="02020603050405020304" pitchFamily="18" charset="0"/>
+                <a:cs typeface="Times New Roman" panose="02020603050405020304" pitchFamily="18" charset="0"/>
+              </a:rPr>
+              <a:t>(</a:t>
+            </a:r>
+            <a:r>
+              <a:rPr lang="zh-TW" altLang="en-US" sz="2600" dirty="0">
+                <a:latin typeface="Times New Roman" panose="02020603050405020304" pitchFamily="18" charset="0"/>
+                <a:cs typeface="Times New Roman" panose="02020603050405020304" pitchFamily="18" charset="0"/>
+              </a:rPr>
+              <a:t>需訂閱開啟</a:t>
+            </a:r>
+            <a:r>
+              <a:rPr lang="en-US" altLang="zh-TW" sz="2600" dirty="0">
+                <a:latin typeface="Times New Roman" panose="02020603050405020304" pitchFamily="18" charset="0"/>
+                <a:cs typeface="Times New Roman" panose="02020603050405020304" pitchFamily="18" charset="0"/>
+              </a:rPr>
+              <a:t>)</a:t>
+            </a:r>
+          </a:p>
+          <a:p>
+            <a:pPr marL="514350" indent="-514350">
+              <a:buFont typeface="+mj-lt"/>
+              <a:buAutoNum type="arabicPeriod"/>
+            </a:pPr>
+            <a:r>
+              <a:rPr lang="zh-TW" altLang="en-US" sz="2600" dirty="0">
+                <a:latin typeface="Times New Roman" panose="02020603050405020304" pitchFamily="18" charset="0"/>
+                <a:cs typeface="Times New Roman" panose="02020603050405020304" pitchFamily="18" charset="0"/>
+              </a:rPr>
+              <a:t>可一次刪除多個</a:t>
+            </a:r>
+          </a:p>
+          <a:p>
+            <a:pPr marL="514350" indent="-514350">
+              <a:buFont typeface="+mj-lt"/>
+              <a:buAutoNum type="arabicPeriod"/>
+            </a:pPr>
+            <a:r>
+              <a:rPr lang="zh-TW" altLang="en-US" sz="2600" dirty="0">
+                <a:latin typeface="Times New Roman" panose="02020603050405020304" pitchFamily="18" charset="0"/>
+                <a:cs typeface="Times New Roman" panose="02020603050405020304" pitchFamily="18" charset="0"/>
+              </a:rPr>
+              <a:t>可自定排序</a:t>
+            </a:r>
+          </a:p>
+          <a:p>
+            <a:pPr marL="514350" indent="-514350">
+              <a:buFont typeface="+mj-lt"/>
+              <a:buAutoNum type="arabicPeriod"/>
+            </a:pPr>
+            <a:r>
+              <a:rPr lang="zh-TW" altLang="en-US" sz="2600" dirty="0">
+                <a:latin typeface="Times New Roman" panose="02020603050405020304" pitchFamily="18" charset="0"/>
+                <a:cs typeface="Times New Roman" panose="02020603050405020304" pitchFamily="18" charset="0"/>
+              </a:rPr>
+              <a:t>生成簡易圖表、分析圖表</a:t>
+            </a:r>
+            <a:endParaRPr lang="en-US" altLang="zh-TW" sz="2600" dirty="0">
+              <a:latin typeface="Times New Roman" panose="02020603050405020304" pitchFamily="18" charset="0"/>
+              <a:cs typeface="Times New Roman" panose="02020603050405020304" pitchFamily="18" charset="0"/>
+            </a:endParaRPr>
+          </a:p>
+          <a:p>
+            <a:pPr marL="514350" indent="-514350">
+              <a:buFont typeface="+mj-lt"/>
+              <a:buAutoNum type="arabicPeriod"/>
+            </a:pPr>
+            <a:r>
+              <a:rPr lang="zh-TW" altLang="en-US" sz="2600" dirty="0">
+                <a:latin typeface="Times New Roman" panose="02020603050405020304" pitchFamily="18" charset="0"/>
+                <a:cs typeface="Times New Roman" panose="02020603050405020304" pitchFamily="18" charset="0"/>
+              </a:rPr>
+              <a:t>可加入圖文記錄，當小日記</a:t>
+            </a:r>
+            <a:endParaRPr lang="en-US" altLang="zh-TW" sz="2600" dirty="0">
+              <a:latin typeface="Times New Roman" panose="02020603050405020304" pitchFamily="18" charset="0"/>
+              <a:cs typeface="Times New Roman" panose="02020603050405020304" pitchFamily="18" charset="0"/>
+            </a:endParaRPr>
+          </a:p>
+          <a:p>
             <a:endParaRPr lang="en-US" altLang="zh-TW" dirty="0">
               <a:latin typeface="Times New Roman" panose="02020603050405020304" pitchFamily="18" charset="0"/>
               <a:cs typeface="Times New Roman" panose="02020603050405020304" pitchFamily="18" charset="0"/>
             </a:endParaRPr>
           </a:p>
           <a:p>
-            <a:r>
-              <a:rPr lang="zh-TW" altLang="en-US" dirty="0">
-                <a:latin typeface="Times New Roman" panose="02020603050405020304" pitchFamily="18" charset="0"/>
-                <a:cs typeface="Times New Roman" panose="02020603050405020304" pitchFamily="18" charset="0"/>
-              </a:rPr>
-              <a:t>優點：畫面簡單大方、強大的時間及行程功能、目標達成特效、可加入筆記、多直條圖及週期分析圖表、有不同版面可調、可產生小工具在桌面</a:t>
-            </a:r>
-            <a:r>
-              <a:rPr lang="en-US" altLang="zh-TW" dirty="0">
-                <a:latin typeface="Times New Roman" panose="02020603050405020304" pitchFamily="18" charset="0"/>
-                <a:cs typeface="Times New Roman" panose="02020603050405020304" pitchFamily="18" charset="0"/>
-              </a:rPr>
-              <a:t>(Widget</a:t>
-            </a:r>
-            <a:r>
-              <a:rPr lang="zh-TW" altLang="en-US" dirty="0">
-                <a:latin typeface="Times New Roman" panose="02020603050405020304" pitchFamily="18" charset="0"/>
-                <a:cs typeface="Times New Roman" panose="02020603050405020304" pitchFamily="18" charset="0"/>
-              </a:rPr>
-              <a:t>化</a:t>
-            </a:r>
-            <a:r>
-              <a:rPr lang="en-US" altLang="zh-TW" dirty="0">
-                <a:latin typeface="Times New Roman" panose="02020603050405020304" pitchFamily="18" charset="0"/>
-                <a:cs typeface="Times New Roman" panose="02020603050405020304" pitchFamily="18" charset="0"/>
-              </a:rPr>
-              <a:t>)</a:t>
-            </a:r>
-            <a:r>
-              <a:rPr lang="zh-TW" altLang="en-US" dirty="0">
-                <a:latin typeface="Times New Roman" panose="02020603050405020304" pitchFamily="18" charset="0"/>
-                <a:cs typeface="Times New Roman" panose="02020603050405020304" pitchFamily="18" charset="0"/>
-              </a:rPr>
-              <a:t> 、記錄每個動作</a:t>
-            </a:r>
             <a:endParaRPr lang="en-US" altLang="zh-TW" dirty="0">
               <a:latin typeface="Times New Roman" panose="02020603050405020304" pitchFamily="18" charset="0"/>
               <a:cs typeface="Times New Roman" panose="02020603050405020304" pitchFamily="18" charset="0"/>
             </a:endParaRPr>
           </a:p>
-          <a:p>
-            <a:r>
-              <a:rPr lang="zh-TW" altLang="en-US" dirty="0">
-                <a:latin typeface="Times New Roman" panose="02020603050405020304" pitchFamily="18" charset="0"/>
-                <a:cs typeface="Times New Roman" panose="02020603050405020304" pitchFamily="18" charset="0"/>
-              </a:rPr>
-              <a:t>缺點：很多意義不明的功能沒說明、一些小</a:t>
-            </a:r>
-            <a:r>
-              <a:rPr lang="en-US" altLang="zh-TW" dirty="0">
-                <a:latin typeface="Times New Roman" panose="02020603050405020304" pitchFamily="18" charset="0"/>
-                <a:cs typeface="Times New Roman" panose="02020603050405020304" pitchFamily="18" charset="0"/>
-              </a:rPr>
-              <a:t>bug</a:t>
-            </a:r>
-            <a:r>
-              <a:rPr lang="zh-TW" altLang="en-US" dirty="0">
-                <a:latin typeface="Times New Roman" panose="02020603050405020304" pitchFamily="18" charset="0"/>
-                <a:cs typeface="Times New Roman" panose="02020603050405020304" pitchFamily="18" charset="0"/>
-              </a:rPr>
-              <a:t>、課金要求較高</a:t>
-            </a:r>
-          </a:p>
-          <a:p>
-            <a:endParaRPr lang="zh-TW" altLang="en-US" dirty="0">
-              <a:latin typeface="Times New Roman" panose="02020603050405020304" pitchFamily="18" charset="0"/>
-              <a:cs typeface="Times New Roman" panose="02020603050405020304" pitchFamily="18" charset="0"/>
-            </a:endParaRPr>
-          </a:p>
-          <a:p>
-            <a:endParaRPr lang="zh-TW" altLang="en-US" dirty="0">
-              <a:latin typeface="Times New Roman" panose="02020603050405020304" pitchFamily="18" charset="0"/>
-              <a:cs typeface="Times New Roman" panose="02020603050405020304" pitchFamily="18" charset="0"/>
-            </a:endParaRPr>
-          </a:p>
         </p:txBody>
       </p:sp>
     </p:spTree>
     <p:extLst>
       <p:ext uri="{BB962C8B-B14F-4D97-AF65-F5344CB8AC3E}">
-        <p14:creationId xmlns:p14="http://schemas.microsoft.com/office/powerpoint/2010/main" val="1699865115"/>
+        <p14:creationId xmlns:p14="http://schemas.microsoft.com/office/powerpoint/2010/main" val="2696443474"/>
       </p:ext>
     </p:extLst>
   </p:cSld>

</xml_diff>